<commit_message>
Updated the centroid offset figure formatting as well  north offset calcs
The major piece of work in this was to estimate the offset significance for
the northern subcluster in the merger axis coordinate system.
</commit_message>
<xml_diff>
--- a/Chapter4/AnalysisFiles/Reformatted Figures.pptx
+++ b/Chapter4/AnalysisFiles/Reformatted Figures.pptx
@@ -6,6 +6,10 @@
   </p:sldMasterIdLst>
   <p:sldIdLst>
     <p:sldId id="256" r:id="rId2"/>
+    <p:sldId id="257" r:id="rId3"/>
+    <p:sldId id="258" r:id="rId4"/>
+    <p:sldId id="259" r:id="rId5"/>
+    <p:sldId id="260" r:id="rId6"/>
   </p:sldIdLst>
   <p:sldSz cx="9144000" cy="6858000" type="screen4x3"/>
   <p:notesSz cx="6858000" cy="9144000"/>
@@ -3232,6 +3236,1121 @@
 </p:sld>
 </file>
 
+<file path=ppt/slides/slide2.xml><?xml version="1.0" encoding="utf-8"?>
+<p:sld xmlns:a="http://schemas.openxmlformats.org/drawingml/2006/main" xmlns:r="http://schemas.openxmlformats.org/officeDocument/2006/relationships" xmlns:p="http://schemas.openxmlformats.org/presentationml/2006/main">
+  <p:cSld>
+    <p:spTree>
+      <p:nvGrpSpPr>
+        <p:cNvPr id="1" name=""/>
+        <p:cNvGrpSpPr/>
+        <p:nvPr/>
+      </p:nvGrpSpPr>
+      <p:grpSpPr>
+        <a:xfrm>
+          <a:off x="0" y="0"/>
+          <a:ext cx="0" cy="0"/>
+          <a:chOff x="0" y="0"/>
+          <a:chExt cx="0" cy="0"/>
+        </a:xfrm>
+      </p:grpSpPr>
+      <p:grpSp>
+        <p:nvGrpSpPr>
+          <p:cNvPr id="2" name="Group 1"/>
+          <p:cNvGrpSpPr/>
+          <p:nvPr/>
+        </p:nvGrpSpPr>
+        <p:grpSpPr>
+          <a:xfrm>
+            <a:off x="1752031" y="1194323"/>
+            <a:ext cx="5486400" cy="4167635"/>
+            <a:chOff x="1752031" y="1194323"/>
+            <a:chExt cx="5486400" cy="4167635"/>
+          </a:xfrm>
+        </p:grpSpPr>
+        <p:pic>
+          <p:nvPicPr>
+            <p:cNvPr id="2050" name="Picture 2" descr="C:\Users\WILLDA~1\AppData\Local\Temp\VMwareDnD\9110b323\northcentroids_histplot2d.png"/>
+            <p:cNvPicPr>
+              <a:picLocks noChangeAspect="1" noChangeArrowheads="1"/>
+            </p:cNvPicPr>
+            <p:nvPr/>
+          </p:nvPicPr>
+          <p:blipFill>
+            <a:blip r:embed="rId2">
+              <a:extLst>
+                <a:ext uri="{28A0092B-C50C-407E-A947-70E740481C1C}">
+                  <a14:useLocalDpi xmlns:a14="http://schemas.microsoft.com/office/drawing/2010/main" val="0"/>
+                </a:ext>
+              </a:extLst>
+            </a:blip>
+            <a:srcRect/>
+            <a:stretch>
+              <a:fillRect/>
+            </a:stretch>
+          </p:blipFill>
+          <p:spPr bwMode="auto">
+            <a:xfrm>
+              <a:off x="1752031" y="1194323"/>
+              <a:ext cx="5486400" cy="4167635"/>
+            </a:xfrm>
+            <a:prstGeom prst="rect">
+              <a:avLst/>
+            </a:prstGeom>
+            <a:noFill/>
+            <a:extLst>
+              <a:ext uri="{909E8E84-426E-40DD-AFC4-6F175D3DCCD1}">
+                <a14:hiddenFill xmlns:a14="http://schemas.microsoft.com/office/drawing/2010/main">
+                  <a:solidFill>
+                    <a:srgbClr val="FFFFFF"/>
+                  </a:solidFill>
+                </a14:hiddenFill>
+              </a:ext>
+            </a:extLst>
+          </p:spPr>
+        </p:pic>
+        <p:sp>
+          <p:nvSpPr>
+            <p:cNvPr id="3" name="TextBox 2"/>
+            <p:cNvSpPr txBox="1"/>
+            <p:nvPr/>
+          </p:nvSpPr>
+          <p:spPr>
+            <a:xfrm>
+              <a:off x="5165766" y="4744193"/>
+              <a:ext cx="1872949" cy="338554"/>
+            </a:xfrm>
+            <a:prstGeom prst="rect">
+              <a:avLst/>
+            </a:prstGeom>
+            <a:noFill/>
+          </p:spPr>
+          <p:txBody>
+            <a:bodyPr wrap="none" rtlCol="0">
+              <a:spAutoFit/>
+            </a:bodyPr>
+            <a:lstStyle/>
+            <a:p>
+              <a:r>
+                <a:rPr lang="en-US" sz="1600" dirty="0" smtClean="0"/>
+                <a:t>Northern Subcluster</a:t>
+              </a:r>
+              <a:endParaRPr lang="en-US" sz="1600" dirty="0"/>
+            </a:p>
+          </p:txBody>
+        </p:sp>
+        <p:sp>
+          <p:nvSpPr>
+            <p:cNvPr id="5" name="Line Callout 2 (Accent Bar) 4"/>
+            <p:cNvSpPr/>
+            <p:nvPr/>
+          </p:nvSpPr>
+          <p:spPr>
+            <a:xfrm>
+              <a:off x="2489712" y="4077725"/>
+              <a:ext cx="914400" cy="457200"/>
+            </a:xfrm>
+            <a:prstGeom prst="accentCallout2">
+              <a:avLst>
+                <a:gd name="adj1" fmla="val 18750"/>
+                <a:gd name="adj2" fmla="val 105100"/>
+                <a:gd name="adj3" fmla="val 18846"/>
+                <a:gd name="adj4" fmla="val 113499"/>
+                <a:gd name="adj5" fmla="val -102398"/>
+                <a:gd name="adj6" fmla="val 148875"/>
+              </a:avLst>
+            </a:prstGeom>
+            <a:noFill/>
+            <a:ln>
+              <a:solidFill>
+                <a:schemeClr val="accent2"/>
+              </a:solidFill>
+            </a:ln>
+          </p:spPr>
+          <p:style>
+            <a:lnRef idx="2">
+              <a:schemeClr val="accent1">
+                <a:shade val="50000"/>
+              </a:schemeClr>
+            </a:lnRef>
+            <a:fillRef idx="1">
+              <a:schemeClr val="accent1"/>
+            </a:fillRef>
+            <a:effectRef idx="0">
+              <a:schemeClr val="accent1"/>
+            </a:effectRef>
+            <a:fontRef idx="minor">
+              <a:schemeClr val="lt1"/>
+            </a:fontRef>
+          </p:style>
+          <p:txBody>
+            <a:bodyPr rtlCol="0" anchor="ctr"/>
+            <a:lstStyle/>
+            <a:p>
+              <a:pPr algn="r"/>
+              <a:r>
+                <a:rPr lang="en-US" sz="1600" dirty="0" smtClean="0">
+                  <a:solidFill>
+                    <a:schemeClr val="accent2"/>
+                  </a:solidFill>
+                </a:rPr>
+                <a:t>Galaxy</a:t>
+              </a:r>
+            </a:p>
+            <a:p>
+              <a:pPr algn="r"/>
+              <a:r>
+                <a:rPr lang="en-US" sz="1600" dirty="0" smtClean="0">
+                  <a:solidFill>
+                    <a:schemeClr val="accent2"/>
+                  </a:solidFill>
+                </a:rPr>
+                <a:t>Centroid</a:t>
+              </a:r>
+              <a:endParaRPr lang="en-US" sz="1600" dirty="0">
+                <a:solidFill>
+                  <a:schemeClr val="accent2"/>
+                </a:solidFill>
+              </a:endParaRPr>
+            </a:p>
+          </p:txBody>
+        </p:sp>
+        <p:sp>
+          <p:nvSpPr>
+            <p:cNvPr id="6" name="Line Callout 2 (Accent Bar) 5"/>
+            <p:cNvSpPr/>
+            <p:nvPr/>
+          </p:nvSpPr>
+          <p:spPr>
+            <a:xfrm>
+              <a:off x="2553046" y="1742243"/>
+              <a:ext cx="914400" cy="457200"/>
+            </a:xfrm>
+            <a:prstGeom prst="accentCallout2">
+              <a:avLst>
+                <a:gd name="adj1" fmla="val 18750"/>
+                <a:gd name="adj2" fmla="val 105100"/>
+                <a:gd name="adj3" fmla="val 18846"/>
+                <a:gd name="adj4" fmla="val 113499"/>
+                <a:gd name="adj5" fmla="val 178445"/>
+                <a:gd name="adj6" fmla="val 174199"/>
+              </a:avLst>
+            </a:prstGeom>
+            <a:noFill/>
+            <a:ln>
+              <a:solidFill>
+                <a:schemeClr val="accent1"/>
+              </a:solidFill>
+            </a:ln>
+          </p:spPr>
+          <p:style>
+            <a:lnRef idx="2">
+              <a:schemeClr val="accent1">
+                <a:shade val="50000"/>
+              </a:schemeClr>
+            </a:lnRef>
+            <a:fillRef idx="1">
+              <a:schemeClr val="accent1"/>
+            </a:fillRef>
+            <a:effectRef idx="0">
+              <a:schemeClr val="accent1"/>
+            </a:effectRef>
+            <a:fontRef idx="minor">
+              <a:schemeClr val="lt1"/>
+            </a:fontRef>
+          </p:style>
+          <p:txBody>
+            <a:bodyPr rtlCol="0" anchor="ctr"/>
+            <a:lstStyle/>
+            <a:p>
+              <a:pPr algn="r"/>
+              <a:r>
+                <a:rPr lang="en-US" sz="1600" dirty="0" smtClean="0">
+                  <a:solidFill>
+                    <a:schemeClr val="accent1"/>
+                  </a:solidFill>
+                </a:rPr>
+                <a:t>Lensing</a:t>
+              </a:r>
+            </a:p>
+            <a:p>
+              <a:pPr algn="r"/>
+              <a:r>
+                <a:rPr lang="en-US" sz="1600" dirty="0" smtClean="0">
+                  <a:solidFill>
+                    <a:schemeClr val="accent1"/>
+                  </a:solidFill>
+                </a:rPr>
+                <a:t>Centroid</a:t>
+              </a:r>
+              <a:endParaRPr lang="en-US" sz="1600" dirty="0">
+                <a:solidFill>
+                  <a:schemeClr val="accent1"/>
+                </a:solidFill>
+              </a:endParaRPr>
+            </a:p>
+          </p:txBody>
+        </p:sp>
+      </p:grpSp>
+      <p:cxnSp>
+        <p:nvCxnSpPr>
+          <p:cNvPr id="8" name="Straight Connector 7"/>
+          <p:cNvCxnSpPr/>
+          <p:nvPr/>
+        </p:nvCxnSpPr>
+        <p:spPr>
+          <a:xfrm flipV="1">
+            <a:off x="3734790" y="1318160"/>
+            <a:ext cx="1453896" cy="3758184"/>
+          </a:xfrm>
+          <a:prstGeom prst="line">
+            <a:avLst/>
+          </a:prstGeom>
+          <a:ln w="19050">
+            <a:solidFill>
+              <a:schemeClr val="accent4"/>
+            </a:solidFill>
+            <a:prstDash val="dash"/>
+          </a:ln>
+        </p:spPr>
+        <p:style>
+          <a:lnRef idx="1">
+            <a:schemeClr val="accent1"/>
+          </a:lnRef>
+          <a:fillRef idx="0">
+            <a:schemeClr val="accent1"/>
+          </a:fillRef>
+          <a:effectRef idx="0">
+            <a:schemeClr val="accent1"/>
+          </a:effectRef>
+          <a:fontRef idx="minor">
+            <a:schemeClr val="tx1"/>
+          </a:fontRef>
+        </p:style>
+      </p:cxnSp>
+      <p:sp>
+        <p:nvSpPr>
+          <p:cNvPr id="9" name="Line Callout 2 (Accent Bar) 8"/>
+          <p:cNvSpPr/>
+          <p:nvPr/>
+        </p:nvSpPr>
+        <p:spPr>
+          <a:xfrm>
+            <a:off x="3420093" y="1385985"/>
+            <a:ext cx="1288326" cy="245660"/>
+          </a:xfrm>
+          <a:prstGeom prst="accentCallout2">
+            <a:avLst>
+              <a:gd name="adj1" fmla="val 18750"/>
+              <a:gd name="adj2" fmla="val 100491"/>
+              <a:gd name="adj3" fmla="val 18846"/>
+              <a:gd name="adj4" fmla="val 108429"/>
+              <a:gd name="adj5" fmla="val 67659"/>
+              <a:gd name="adj6" fmla="val 129369"/>
+            </a:avLst>
+          </a:prstGeom>
+          <a:noFill/>
+          <a:ln w="12700">
+            <a:solidFill>
+              <a:schemeClr val="accent4"/>
+            </a:solidFill>
+            <a:prstDash val="dash"/>
+          </a:ln>
+        </p:spPr>
+        <p:style>
+          <a:lnRef idx="2">
+            <a:schemeClr val="accent1">
+              <a:shade val="50000"/>
+            </a:schemeClr>
+          </a:lnRef>
+          <a:fillRef idx="1">
+            <a:schemeClr val="accent1"/>
+          </a:fillRef>
+          <a:effectRef idx="0">
+            <a:schemeClr val="accent1"/>
+          </a:effectRef>
+          <a:fontRef idx="minor">
+            <a:schemeClr val="lt1"/>
+          </a:fontRef>
+        </p:style>
+        <p:txBody>
+          <a:bodyPr rtlCol="0" anchor="ctr"/>
+          <a:lstStyle/>
+          <a:p>
+            <a:pPr algn="r"/>
+            <a:r>
+              <a:rPr lang="en-US" sz="1400" dirty="0" smtClean="0">
+                <a:solidFill>
+                  <a:schemeClr val="accent4"/>
+                </a:solidFill>
+              </a:rPr>
+              <a:t>Merger Axis</a:t>
+            </a:r>
+            <a:endParaRPr lang="en-US" sz="1400" dirty="0">
+              <a:solidFill>
+                <a:schemeClr val="accent4"/>
+              </a:solidFill>
+            </a:endParaRPr>
+          </a:p>
+        </p:txBody>
+      </p:sp>
+    </p:spTree>
+    <p:extLst>
+      <p:ext uri="{BB962C8B-B14F-4D97-AF65-F5344CB8AC3E}">
+        <p14:creationId xmlns:p14="http://schemas.microsoft.com/office/powerpoint/2010/main" val="4201369496"/>
+      </p:ext>
+    </p:extLst>
+  </p:cSld>
+  <p:clrMapOvr>
+    <a:masterClrMapping/>
+  </p:clrMapOvr>
+</p:sld>
+</file>
+
+<file path=ppt/slides/slide3.xml><?xml version="1.0" encoding="utf-8"?>
+<p:sld xmlns:a="http://schemas.openxmlformats.org/drawingml/2006/main" xmlns:r="http://schemas.openxmlformats.org/officeDocument/2006/relationships" xmlns:p="http://schemas.openxmlformats.org/presentationml/2006/main">
+  <p:cSld>
+    <p:spTree>
+      <p:nvGrpSpPr>
+        <p:cNvPr id="1" name=""/>
+        <p:cNvGrpSpPr/>
+        <p:nvPr/>
+      </p:nvGrpSpPr>
+      <p:grpSpPr>
+        <a:xfrm>
+          <a:off x="0" y="0"/>
+          <a:ext cx="0" cy="0"/>
+          <a:chOff x="0" y="0"/>
+          <a:chExt cx="0" cy="0"/>
+        </a:xfrm>
+      </p:grpSpPr>
+      <p:grpSp>
+        <p:nvGrpSpPr>
+          <p:cNvPr id="11" name="Group 10"/>
+          <p:cNvGrpSpPr/>
+          <p:nvPr/>
+        </p:nvGrpSpPr>
+        <p:grpSpPr>
+          <a:xfrm>
+            <a:off x="1835159" y="1376854"/>
+            <a:ext cx="5486400" cy="4184543"/>
+            <a:chOff x="1835159" y="1376854"/>
+            <a:chExt cx="5486400" cy="4184543"/>
+          </a:xfrm>
+        </p:grpSpPr>
+        <p:grpSp>
+          <p:nvGrpSpPr>
+            <p:cNvPr id="6" name="Group 5"/>
+            <p:cNvGrpSpPr/>
+            <p:nvPr/>
+          </p:nvGrpSpPr>
+          <p:grpSpPr>
+            <a:xfrm>
+              <a:off x="1835159" y="1376854"/>
+              <a:ext cx="5486400" cy="4184543"/>
+              <a:chOff x="1835159" y="1376854"/>
+              <a:chExt cx="5486400" cy="4184543"/>
+            </a:xfrm>
+          </p:grpSpPr>
+          <p:pic>
+            <p:nvPicPr>
+              <p:cNvPr id="3074" name="Picture 2" descr="C:\Users\WILLDA~1\AppData\Local\Temp\VMwareDnD\9318b512\southcentroids_histplot2d.png"/>
+              <p:cNvPicPr>
+                <a:picLocks noChangeAspect="1" noChangeArrowheads="1"/>
+              </p:cNvPicPr>
+              <p:nvPr/>
+            </p:nvPicPr>
+            <p:blipFill>
+              <a:blip r:embed="rId2">
+                <a:extLst>
+                  <a:ext uri="{28A0092B-C50C-407E-A947-70E740481C1C}">
+                    <a14:useLocalDpi xmlns:a14="http://schemas.microsoft.com/office/drawing/2010/main" val="0"/>
+                  </a:ext>
+                </a:extLst>
+              </a:blip>
+              <a:srcRect/>
+              <a:stretch>
+                <a:fillRect/>
+              </a:stretch>
+            </p:blipFill>
+            <p:spPr bwMode="auto">
+              <a:xfrm>
+                <a:off x="1835159" y="1376854"/>
+                <a:ext cx="5486400" cy="4184543"/>
+              </a:xfrm>
+              <a:prstGeom prst="rect">
+                <a:avLst/>
+              </a:prstGeom>
+              <a:noFill/>
+              <a:extLst>
+                <a:ext uri="{909E8E84-426E-40DD-AFC4-6F175D3DCCD1}">
+                  <a14:hiddenFill xmlns:a14="http://schemas.microsoft.com/office/drawing/2010/main">
+                    <a:solidFill>
+                      <a:srgbClr val="FFFFFF"/>
+                    </a:solidFill>
+                  </a14:hiddenFill>
+                </a:ext>
+              </a:extLst>
+            </p:spPr>
+          </p:pic>
+          <p:sp>
+            <p:nvSpPr>
+              <p:cNvPr id="3" name="Line Callout 2 (Accent Bar) 2"/>
+              <p:cNvSpPr/>
+              <p:nvPr/>
+            </p:nvSpPr>
+            <p:spPr>
+              <a:xfrm>
+                <a:off x="5739522" y="3352292"/>
+                <a:ext cx="914400" cy="457200"/>
+              </a:xfrm>
+              <a:prstGeom prst="accentCallout2">
+                <a:avLst>
+                  <a:gd name="adj1" fmla="val 18750"/>
+                  <a:gd name="adj2" fmla="val -8333"/>
+                  <a:gd name="adj3" fmla="val 18750"/>
+                  <a:gd name="adj4" fmla="val -16667"/>
+                  <a:gd name="adj5" fmla="val 60029"/>
+                  <a:gd name="adj6" fmla="val -65671"/>
+                </a:avLst>
+              </a:prstGeom>
+              <a:noFill/>
+              <a:ln>
+                <a:solidFill>
+                  <a:schemeClr val="accent1"/>
+                </a:solidFill>
+              </a:ln>
+            </p:spPr>
+            <p:style>
+              <a:lnRef idx="2">
+                <a:schemeClr val="accent1">
+                  <a:shade val="50000"/>
+                </a:schemeClr>
+              </a:lnRef>
+              <a:fillRef idx="1">
+                <a:schemeClr val="accent1"/>
+              </a:fillRef>
+              <a:effectRef idx="0">
+                <a:schemeClr val="accent1"/>
+              </a:effectRef>
+              <a:fontRef idx="minor">
+                <a:schemeClr val="lt1"/>
+              </a:fontRef>
+            </p:style>
+            <p:txBody>
+              <a:bodyPr rtlCol="0" anchor="ctr"/>
+              <a:lstStyle/>
+              <a:p>
+                <a:r>
+                  <a:rPr lang="en-US" sz="1600" dirty="0" smtClean="0">
+                    <a:solidFill>
+                      <a:schemeClr val="accent1"/>
+                    </a:solidFill>
+                  </a:rPr>
+                  <a:t>Lensing</a:t>
+                </a:r>
+              </a:p>
+              <a:p>
+                <a:r>
+                  <a:rPr lang="en-US" sz="1600" dirty="0" smtClean="0">
+                    <a:solidFill>
+                      <a:schemeClr val="accent1"/>
+                    </a:solidFill>
+                  </a:rPr>
+                  <a:t>Centroid</a:t>
+                </a:r>
+                <a:endParaRPr lang="en-US" sz="1600" dirty="0">
+                  <a:solidFill>
+                    <a:schemeClr val="accent1"/>
+                  </a:solidFill>
+                </a:endParaRPr>
+              </a:p>
+            </p:txBody>
+          </p:sp>
+          <p:sp>
+            <p:nvSpPr>
+              <p:cNvPr id="5" name="Line Callout 2 (Accent Bar) 4"/>
+              <p:cNvSpPr/>
+              <p:nvPr/>
+            </p:nvSpPr>
+            <p:spPr>
+              <a:xfrm>
+                <a:off x="2608466" y="4736806"/>
+                <a:ext cx="914400" cy="457200"/>
+              </a:xfrm>
+              <a:prstGeom prst="accentCallout2">
+                <a:avLst>
+                  <a:gd name="adj1" fmla="val 18750"/>
+                  <a:gd name="adj2" fmla="val 105100"/>
+                  <a:gd name="adj3" fmla="val 18846"/>
+                  <a:gd name="adj4" fmla="val 113499"/>
+                  <a:gd name="adj5" fmla="val -35407"/>
+                  <a:gd name="adj6" fmla="val 161862"/>
+                </a:avLst>
+              </a:prstGeom>
+              <a:noFill/>
+              <a:ln>
+                <a:solidFill>
+                  <a:schemeClr val="accent2"/>
+                </a:solidFill>
+              </a:ln>
+            </p:spPr>
+            <p:style>
+              <a:lnRef idx="2">
+                <a:schemeClr val="accent1">
+                  <a:shade val="50000"/>
+                </a:schemeClr>
+              </a:lnRef>
+              <a:fillRef idx="1">
+                <a:schemeClr val="accent1"/>
+              </a:fillRef>
+              <a:effectRef idx="0">
+                <a:schemeClr val="accent1"/>
+              </a:effectRef>
+              <a:fontRef idx="minor">
+                <a:schemeClr val="lt1"/>
+              </a:fontRef>
+            </p:style>
+            <p:txBody>
+              <a:bodyPr rtlCol="0" anchor="ctr"/>
+              <a:lstStyle/>
+              <a:p>
+                <a:pPr algn="r"/>
+                <a:r>
+                  <a:rPr lang="en-US" sz="1600" dirty="0" smtClean="0">
+                    <a:solidFill>
+                      <a:schemeClr val="accent2"/>
+                    </a:solidFill>
+                  </a:rPr>
+                  <a:t>Galaxy</a:t>
+                </a:r>
+              </a:p>
+              <a:p>
+                <a:pPr algn="r"/>
+                <a:r>
+                  <a:rPr lang="en-US" sz="1600" dirty="0" smtClean="0">
+                    <a:solidFill>
+                      <a:schemeClr val="accent2"/>
+                    </a:solidFill>
+                  </a:rPr>
+                  <a:t>Centroid</a:t>
+                </a:r>
+                <a:endParaRPr lang="en-US" sz="1600" dirty="0">
+                  <a:solidFill>
+                    <a:schemeClr val="accent2"/>
+                  </a:solidFill>
+                </a:endParaRPr>
+              </a:p>
+            </p:txBody>
+          </p:sp>
+          <p:sp>
+            <p:nvSpPr>
+              <p:cNvPr id="4" name="TextBox 3"/>
+              <p:cNvSpPr txBox="1"/>
+              <p:nvPr/>
+            </p:nvSpPr>
+            <p:spPr>
+              <a:xfrm>
+                <a:off x="5248894" y="4946072"/>
+                <a:ext cx="1869743" cy="338554"/>
+              </a:xfrm>
+              <a:prstGeom prst="rect">
+                <a:avLst/>
+              </a:prstGeom>
+              <a:noFill/>
+            </p:spPr>
+            <p:txBody>
+              <a:bodyPr wrap="none" rtlCol="0">
+                <a:spAutoFit/>
+              </a:bodyPr>
+              <a:lstStyle/>
+              <a:p>
+                <a:r>
+                  <a:rPr lang="en-US" sz="1600" dirty="0" smtClean="0"/>
+                  <a:t>Southern Subcluster</a:t>
+                </a:r>
+                <a:endParaRPr lang="en-US" sz="1600" dirty="0"/>
+              </a:p>
+            </p:txBody>
+          </p:sp>
+        </p:grpSp>
+        <p:cxnSp>
+          <p:nvCxnSpPr>
+            <p:cNvPr id="8" name="Straight Connector 7"/>
+            <p:cNvCxnSpPr/>
+            <p:nvPr/>
+          </p:nvCxnSpPr>
+          <p:spPr>
+            <a:xfrm flipV="1">
+              <a:off x="3960421" y="1502229"/>
+              <a:ext cx="1894114" cy="3758540"/>
+            </a:xfrm>
+            <a:prstGeom prst="line">
+              <a:avLst/>
+            </a:prstGeom>
+            <a:ln w="19050">
+              <a:solidFill>
+                <a:schemeClr val="accent3"/>
+              </a:solidFill>
+              <a:prstDash val="dashDot"/>
+            </a:ln>
+          </p:spPr>
+          <p:style>
+            <a:lnRef idx="1">
+              <a:schemeClr val="accent1"/>
+            </a:lnRef>
+            <a:fillRef idx="0">
+              <a:schemeClr val="accent1"/>
+            </a:fillRef>
+            <a:effectRef idx="0">
+              <a:schemeClr val="accent1"/>
+            </a:effectRef>
+            <a:fontRef idx="minor">
+              <a:schemeClr val="tx1"/>
+            </a:fontRef>
+          </p:style>
+        </p:cxnSp>
+        <p:cxnSp>
+          <p:nvCxnSpPr>
+            <p:cNvPr id="10" name="Straight Connector 9"/>
+            <p:cNvCxnSpPr/>
+            <p:nvPr/>
+          </p:nvCxnSpPr>
+          <p:spPr>
+            <a:xfrm flipV="1">
+              <a:off x="4061362" y="1520041"/>
+              <a:ext cx="1453896" cy="3758184"/>
+            </a:xfrm>
+            <a:prstGeom prst="line">
+              <a:avLst/>
+            </a:prstGeom>
+            <a:ln w="19050">
+              <a:solidFill>
+                <a:schemeClr val="accent4"/>
+              </a:solidFill>
+              <a:prstDash val="dash"/>
+            </a:ln>
+          </p:spPr>
+          <p:style>
+            <a:lnRef idx="1">
+              <a:schemeClr val="accent1"/>
+            </a:lnRef>
+            <a:fillRef idx="0">
+              <a:schemeClr val="accent1"/>
+            </a:fillRef>
+            <a:effectRef idx="0">
+              <a:schemeClr val="accent1"/>
+            </a:effectRef>
+            <a:fontRef idx="minor">
+              <a:schemeClr val="tx1"/>
+            </a:fontRef>
+          </p:style>
+        </p:cxnSp>
+        <p:sp>
+          <p:nvSpPr>
+            <p:cNvPr id="12" name="Line Callout 2 (Accent Bar) 11"/>
+            <p:cNvSpPr/>
+            <p:nvPr/>
+          </p:nvSpPr>
+          <p:spPr>
+            <a:xfrm>
+              <a:off x="3390405" y="1736307"/>
+              <a:ext cx="1288326" cy="245660"/>
+            </a:xfrm>
+            <a:prstGeom prst="accentCallout2">
+              <a:avLst>
+                <a:gd name="adj1" fmla="val 18750"/>
+                <a:gd name="adj2" fmla="val 105100"/>
+                <a:gd name="adj3" fmla="val 18846"/>
+                <a:gd name="adj4" fmla="val 113499"/>
+                <a:gd name="adj5" fmla="val 149838"/>
+                <a:gd name="adj6" fmla="val 142274"/>
+              </a:avLst>
+            </a:prstGeom>
+            <a:noFill/>
+            <a:ln w="12700">
+              <a:solidFill>
+                <a:schemeClr val="accent4"/>
+              </a:solidFill>
+              <a:prstDash val="dash"/>
+            </a:ln>
+          </p:spPr>
+          <p:style>
+            <a:lnRef idx="2">
+              <a:schemeClr val="accent1">
+                <a:shade val="50000"/>
+              </a:schemeClr>
+            </a:lnRef>
+            <a:fillRef idx="1">
+              <a:schemeClr val="accent1"/>
+            </a:fillRef>
+            <a:effectRef idx="0">
+              <a:schemeClr val="accent1"/>
+            </a:effectRef>
+            <a:fontRef idx="minor">
+              <a:schemeClr val="lt1"/>
+            </a:fontRef>
+          </p:style>
+          <p:txBody>
+            <a:bodyPr rtlCol="0" anchor="ctr"/>
+            <a:lstStyle/>
+            <a:p>
+              <a:pPr algn="r"/>
+              <a:r>
+                <a:rPr lang="en-US" sz="1400" dirty="0" smtClean="0">
+                  <a:solidFill>
+                    <a:schemeClr val="accent4"/>
+                  </a:solidFill>
+                </a:rPr>
+                <a:t>Merger Axis</a:t>
+              </a:r>
+              <a:endParaRPr lang="en-US" sz="1400" dirty="0">
+                <a:solidFill>
+                  <a:schemeClr val="accent4"/>
+                </a:solidFill>
+              </a:endParaRPr>
+            </a:p>
+          </p:txBody>
+        </p:sp>
+        <p:sp>
+          <p:nvSpPr>
+            <p:cNvPr id="13" name="Line Callout 2 (Accent Bar) 12"/>
+            <p:cNvSpPr/>
+            <p:nvPr/>
+          </p:nvSpPr>
+          <p:spPr>
+            <a:xfrm>
+              <a:off x="5992861" y="2143495"/>
+              <a:ext cx="1049205" cy="605642"/>
+            </a:xfrm>
+            <a:prstGeom prst="accentCallout2">
+              <a:avLst>
+                <a:gd name="adj1" fmla="val 18750"/>
+                <a:gd name="adj2" fmla="val -8333"/>
+                <a:gd name="adj3" fmla="val 18750"/>
+                <a:gd name="adj4" fmla="val -16667"/>
+                <a:gd name="adj5" fmla="val -8266"/>
+                <a:gd name="adj6" fmla="val -40234"/>
+              </a:avLst>
+            </a:prstGeom>
+            <a:noFill/>
+            <a:ln w="12700">
+              <a:solidFill>
+                <a:schemeClr val="accent3"/>
+              </a:solidFill>
+              <a:prstDash val="dashDot"/>
+            </a:ln>
+          </p:spPr>
+          <p:style>
+            <a:lnRef idx="2">
+              <a:schemeClr val="accent1">
+                <a:shade val="50000"/>
+              </a:schemeClr>
+            </a:lnRef>
+            <a:fillRef idx="1">
+              <a:schemeClr val="accent1"/>
+            </a:fillRef>
+            <a:effectRef idx="0">
+              <a:schemeClr val="accent1"/>
+            </a:effectRef>
+            <a:fontRef idx="minor">
+              <a:schemeClr val="lt1"/>
+            </a:fontRef>
+          </p:style>
+          <p:txBody>
+            <a:bodyPr rtlCol="0" anchor="ctr"/>
+            <a:lstStyle/>
+            <a:p>
+              <a:r>
+                <a:rPr lang="en-US" sz="1400" dirty="0" smtClean="0">
+                  <a:solidFill>
+                    <a:schemeClr val="accent3"/>
+                  </a:solidFill>
+                </a:rPr>
+                <a:t>1</a:t>
+              </a:r>
+              <a:r>
+                <a:rPr lang="en-US" sz="1400" baseline="30000" dirty="0" smtClean="0">
+                  <a:solidFill>
+                    <a:schemeClr val="accent3"/>
+                  </a:solidFill>
+                </a:rPr>
+                <a:t>st</a:t>
+              </a:r>
+              <a:r>
+                <a:rPr lang="en-US" sz="1400" dirty="0" smtClean="0">
+                  <a:solidFill>
+                    <a:schemeClr val="accent3"/>
+                  </a:solidFill>
+                </a:rPr>
+                <a:t> Principle Component Axis</a:t>
+              </a:r>
+              <a:endParaRPr lang="en-US" sz="1400" dirty="0">
+                <a:solidFill>
+                  <a:schemeClr val="accent3"/>
+                </a:solidFill>
+              </a:endParaRPr>
+            </a:p>
+          </p:txBody>
+        </p:sp>
+      </p:grpSp>
+    </p:spTree>
+    <p:extLst>
+      <p:ext uri="{BB962C8B-B14F-4D97-AF65-F5344CB8AC3E}">
+        <p14:creationId xmlns:p14="http://schemas.microsoft.com/office/powerpoint/2010/main" val="2631008800"/>
+      </p:ext>
+    </p:extLst>
+  </p:cSld>
+  <p:clrMapOvr>
+    <a:masterClrMapping/>
+  </p:clrMapOvr>
+</p:sld>
+</file>
+
+<file path=ppt/slides/slide4.xml><?xml version="1.0" encoding="utf-8"?>
+<p:sld xmlns:a="http://schemas.openxmlformats.org/drawingml/2006/main" xmlns:r="http://schemas.openxmlformats.org/officeDocument/2006/relationships" xmlns:p="http://schemas.openxmlformats.org/presentationml/2006/main">
+  <p:cSld>
+    <p:spTree>
+      <p:nvGrpSpPr>
+        <p:cNvPr id="1" name=""/>
+        <p:cNvGrpSpPr/>
+        <p:nvPr/>
+      </p:nvGrpSpPr>
+      <p:grpSpPr>
+        <a:xfrm>
+          <a:off x="0" y="0"/>
+          <a:ext cx="0" cy="0"/>
+          <a:chOff x="0" y="0"/>
+          <a:chExt cx="0" cy="0"/>
+        </a:xfrm>
+      </p:grpSpPr>
+      <p:grpSp>
+        <p:nvGrpSpPr>
+          <p:cNvPr id="2" name="Group 1"/>
+          <p:cNvGrpSpPr/>
+          <p:nvPr/>
+        </p:nvGrpSpPr>
+        <p:grpSpPr>
+          <a:xfrm>
+            <a:off x="2257856" y="1504737"/>
+            <a:ext cx="4572000" cy="3482411"/>
+            <a:chOff x="2257856" y="1504737"/>
+            <a:chExt cx="4572000" cy="3482411"/>
+          </a:xfrm>
+        </p:grpSpPr>
+        <p:pic>
+          <p:nvPicPr>
+            <p:cNvPr id="4101" name="Picture 5" descr="C:\Users\WILLDA~1\AppData\Local\Temp\VMwareDnD\5d66e4f9\GalDenVsHSTWL_pzpen_delxPC.png"/>
+            <p:cNvPicPr>
+              <a:picLocks noChangeAspect="1" noChangeArrowheads="1"/>
+            </p:cNvPicPr>
+            <p:nvPr/>
+          </p:nvPicPr>
+          <p:blipFill>
+            <a:blip r:embed="rId2">
+              <a:extLst>
+                <a:ext uri="{28A0092B-C50C-407E-A947-70E740481C1C}">
+                  <a14:useLocalDpi xmlns:a14="http://schemas.microsoft.com/office/drawing/2010/main" val="0"/>
+                </a:ext>
+              </a:extLst>
+            </a:blip>
+            <a:srcRect/>
+            <a:stretch>
+              <a:fillRect/>
+            </a:stretch>
+          </p:blipFill>
+          <p:spPr bwMode="auto">
+            <a:xfrm>
+              <a:off x="2257856" y="1504737"/>
+              <a:ext cx="4572000" cy="3482411"/>
+            </a:xfrm>
+            <a:prstGeom prst="rect">
+              <a:avLst/>
+            </a:prstGeom>
+            <a:noFill/>
+            <a:extLst>
+              <a:ext uri="{909E8E84-426E-40DD-AFC4-6F175D3DCCD1}">
+                <a14:hiddenFill xmlns:a14="http://schemas.microsoft.com/office/drawing/2010/main">
+                  <a:solidFill>
+                    <a:srgbClr val="FFFFFF"/>
+                  </a:solidFill>
+                </a14:hiddenFill>
+              </a:ext>
+            </a:extLst>
+          </p:spPr>
+        </p:pic>
+        <p:sp>
+          <p:nvSpPr>
+            <p:cNvPr id="4" name="TextBox 3"/>
+            <p:cNvSpPr txBox="1"/>
+            <p:nvPr/>
+          </p:nvSpPr>
+          <p:spPr>
+            <a:xfrm>
+              <a:off x="2743200" y="3883232"/>
+              <a:ext cx="946991" cy="523220"/>
+            </a:xfrm>
+            <a:prstGeom prst="rect">
+              <a:avLst/>
+            </a:prstGeom>
+            <a:noFill/>
+          </p:spPr>
+          <p:txBody>
+            <a:bodyPr wrap="none" rtlCol="0">
+              <a:spAutoFit/>
+            </a:bodyPr>
+            <a:lstStyle/>
+            <a:p>
+              <a:r>
+                <a:rPr lang="en-US" sz="1400" dirty="0" smtClean="0"/>
+                <a:t>Southern</a:t>
+              </a:r>
+            </a:p>
+            <a:p>
+              <a:r>
+                <a:rPr lang="en-US" sz="1400" dirty="0" smtClean="0"/>
+                <a:t>Subcluster</a:t>
+              </a:r>
+              <a:endParaRPr lang="en-US" sz="1400" dirty="0"/>
+            </a:p>
+          </p:txBody>
+        </p:sp>
+      </p:grpSp>
+    </p:spTree>
+    <p:extLst>
+      <p:ext uri="{BB962C8B-B14F-4D97-AF65-F5344CB8AC3E}">
+        <p14:creationId xmlns:p14="http://schemas.microsoft.com/office/powerpoint/2010/main" val="1451498121"/>
+      </p:ext>
+    </p:extLst>
+  </p:cSld>
+  <p:clrMapOvr>
+    <a:masterClrMapping/>
+  </p:clrMapOvr>
+</p:sld>
+</file>
+
+<file path=ppt/slides/slide5.xml><?xml version="1.0" encoding="utf-8"?>
+<p:sld xmlns:a="http://schemas.openxmlformats.org/drawingml/2006/main" xmlns:r="http://schemas.openxmlformats.org/officeDocument/2006/relationships" xmlns:p="http://schemas.openxmlformats.org/presentationml/2006/main">
+  <p:cSld>
+    <p:spTree>
+      <p:nvGrpSpPr>
+        <p:cNvPr id="1" name=""/>
+        <p:cNvGrpSpPr/>
+        <p:nvPr/>
+      </p:nvGrpSpPr>
+      <p:grpSpPr>
+        <a:xfrm>
+          <a:off x="0" y="0"/>
+          <a:ext cx="0" cy="0"/>
+          <a:chOff x="0" y="0"/>
+          <a:chExt cx="0" cy="0"/>
+        </a:xfrm>
+      </p:grpSpPr>
+      <p:grpSp>
+        <p:nvGrpSpPr>
+          <p:cNvPr id="2" name="Group 1"/>
+          <p:cNvGrpSpPr/>
+          <p:nvPr/>
+        </p:nvGrpSpPr>
+        <p:grpSpPr>
+          <a:xfrm>
+            <a:off x="1837110" y="1581098"/>
+            <a:ext cx="4572000" cy="3507581"/>
+            <a:chOff x="1837110" y="1581098"/>
+            <a:chExt cx="4572000" cy="3507581"/>
+          </a:xfrm>
+        </p:grpSpPr>
+        <p:pic>
+          <p:nvPicPr>
+            <p:cNvPr id="5124" name="Picture 4" descr="C:\Users\WILLDA~1\AppData\Local\Temp\VMwareDnD\4f64d297\GalDenVsHSTWL_pzpen_delxPC_north_mergeraxis.png"/>
+            <p:cNvPicPr>
+              <a:picLocks noChangeAspect="1" noChangeArrowheads="1"/>
+            </p:cNvPicPr>
+            <p:nvPr/>
+          </p:nvPicPr>
+          <p:blipFill>
+            <a:blip r:embed="rId2">
+              <a:extLst>
+                <a:ext uri="{28A0092B-C50C-407E-A947-70E740481C1C}">
+                  <a14:useLocalDpi xmlns:a14="http://schemas.microsoft.com/office/drawing/2010/main" val="0"/>
+                </a:ext>
+              </a:extLst>
+            </a:blip>
+            <a:srcRect/>
+            <a:stretch>
+              <a:fillRect/>
+            </a:stretch>
+          </p:blipFill>
+          <p:spPr bwMode="auto">
+            <a:xfrm>
+              <a:off x="1837110" y="1581098"/>
+              <a:ext cx="4572000" cy="3507581"/>
+            </a:xfrm>
+            <a:prstGeom prst="rect">
+              <a:avLst/>
+            </a:prstGeom>
+            <a:noFill/>
+            <a:extLst>
+              <a:ext uri="{909E8E84-426E-40DD-AFC4-6F175D3DCCD1}">
+                <a14:hiddenFill xmlns:a14="http://schemas.microsoft.com/office/drawing/2010/main">
+                  <a:solidFill>
+                    <a:srgbClr val="FFFFFF"/>
+                  </a:solidFill>
+                </a14:hiddenFill>
+              </a:ext>
+            </a:extLst>
+          </p:spPr>
+        </p:pic>
+        <p:sp>
+          <p:nvSpPr>
+            <p:cNvPr id="3" name="TextBox 2"/>
+            <p:cNvSpPr txBox="1"/>
+            <p:nvPr/>
+          </p:nvSpPr>
+          <p:spPr>
+            <a:xfrm>
+              <a:off x="5147954" y="1929741"/>
+              <a:ext cx="946991" cy="523220"/>
+            </a:xfrm>
+            <a:prstGeom prst="rect">
+              <a:avLst/>
+            </a:prstGeom>
+            <a:noFill/>
+          </p:spPr>
+          <p:txBody>
+            <a:bodyPr wrap="none" rtlCol="0">
+              <a:spAutoFit/>
+            </a:bodyPr>
+            <a:lstStyle/>
+            <a:p>
+              <a:r>
+                <a:rPr lang="en-US" sz="1400" dirty="0" smtClean="0"/>
+                <a:t>Northern</a:t>
+              </a:r>
+            </a:p>
+            <a:p>
+              <a:pPr algn="r"/>
+              <a:r>
+                <a:rPr lang="en-US" sz="1400" dirty="0" smtClean="0"/>
+                <a:t>Subcluster</a:t>
+              </a:r>
+              <a:endParaRPr lang="en-US" sz="1400" dirty="0"/>
+            </a:p>
+          </p:txBody>
+        </p:sp>
+      </p:grpSp>
+    </p:spTree>
+    <p:extLst>
+      <p:ext uri="{BB962C8B-B14F-4D97-AF65-F5344CB8AC3E}">
+        <p14:creationId xmlns:p14="http://schemas.microsoft.com/office/powerpoint/2010/main" val="1033860564"/>
+      </p:ext>
+    </p:extLst>
+  </p:cSld>
+  <p:clrMapOvr>
+    <a:masterClrMapping/>
+  </p:clrMapOvr>
+</p:sld>
+</file>
+
 <file path=ppt/theme/theme1.xml><?xml version="1.0" encoding="utf-8"?>
 <a:theme xmlns:a="http://schemas.openxmlformats.org/drawingml/2006/main" name="Office Theme">
   <a:themeElements>

</xml_diff>

<commit_message>
minor changes to the reformatted figures power point file
</commit_message>
<xml_diff>
--- a/Chapter4/AnalysisFiles/Reformatted Figures.pptx
+++ b/Chapter4/AnalysisFiles/Reformatted Figures.pptx
@@ -3255,7 +3255,7 @@
       </p:grpSpPr>
       <p:grpSp>
         <p:nvGrpSpPr>
-          <p:cNvPr id="2" name="Group 1"/>
+          <p:cNvPr id="7" name="Group 6"/>
           <p:cNvGrpSpPr/>
           <p:nvPr/>
         </p:nvGrpSpPr>
@@ -3267,103 +3267,307 @@
             <a:chExt cx="5486400" cy="4167635"/>
           </a:xfrm>
         </p:grpSpPr>
-        <p:pic>
-          <p:nvPicPr>
-            <p:cNvPr id="2050" name="Picture 2" descr="C:\Users\WILLDA~1\AppData\Local\Temp\VMwareDnD\9110b323\northcentroids_histplot2d.png"/>
-            <p:cNvPicPr>
-              <a:picLocks noChangeAspect="1" noChangeArrowheads="1"/>
-            </p:cNvPicPr>
+        <p:grpSp>
+          <p:nvGrpSpPr>
+            <p:cNvPr id="2" name="Group 1"/>
+            <p:cNvGrpSpPr/>
             <p:nvPr/>
-          </p:nvPicPr>
-          <p:blipFill>
-            <a:blip r:embed="rId2">
-              <a:extLst>
-                <a:ext uri="{28A0092B-C50C-407E-A947-70E740481C1C}">
-                  <a14:useLocalDpi xmlns:a14="http://schemas.microsoft.com/office/drawing/2010/main" val="0"/>
-                </a:ext>
-              </a:extLst>
-            </a:blip>
-            <a:srcRect/>
-            <a:stretch>
-              <a:fillRect/>
-            </a:stretch>
-          </p:blipFill>
-          <p:spPr bwMode="auto">
+          </p:nvGrpSpPr>
+          <p:grpSpPr>
             <a:xfrm>
               <a:off x="1752031" y="1194323"/>
               <a:ext cx="5486400" cy="4167635"/>
+              <a:chOff x="1752031" y="1194323"/>
+              <a:chExt cx="5486400" cy="4167635"/>
             </a:xfrm>
-            <a:prstGeom prst="rect">
+          </p:grpSpPr>
+          <p:pic>
+            <p:nvPicPr>
+              <p:cNvPr id="2050" name="Picture 2" descr="C:\Users\WILLDA~1\AppData\Local\Temp\VMwareDnD\9110b323\northcentroids_histplot2d.png"/>
+              <p:cNvPicPr>
+                <a:picLocks noChangeAspect="1" noChangeArrowheads="1"/>
+              </p:cNvPicPr>
+              <p:nvPr/>
+            </p:nvPicPr>
+            <p:blipFill>
+              <a:blip r:embed="rId2">
+                <a:extLst>
+                  <a:ext uri="{28A0092B-C50C-407E-A947-70E740481C1C}">
+                    <a14:useLocalDpi xmlns:a14="http://schemas.microsoft.com/office/drawing/2010/main" val="0"/>
+                  </a:ext>
+                </a:extLst>
+              </a:blip>
+              <a:srcRect/>
+              <a:stretch>
+                <a:fillRect/>
+              </a:stretch>
+            </p:blipFill>
+            <p:spPr bwMode="auto">
+              <a:xfrm>
+                <a:off x="1752031" y="1194323"/>
+                <a:ext cx="5486400" cy="4167635"/>
+              </a:xfrm>
+              <a:prstGeom prst="rect">
+                <a:avLst/>
+              </a:prstGeom>
+              <a:noFill/>
+              <a:extLst>
+                <a:ext uri="{909E8E84-426E-40DD-AFC4-6F175D3DCCD1}">
+                  <a14:hiddenFill xmlns:a14="http://schemas.microsoft.com/office/drawing/2010/main">
+                    <a:solidFill>
+                      <a:srgbClr val="FFFFFF"/>
+                    </a:solidFill>
+                  </a14:hiddenFill>
+                </a:ext>
+              </a:extLst>
+            </p:spPr>
+          </p:pic>
+          <p:sp>
+            <p:nvSpPr>
+              <p:cNvPr id="3" name="TextBox 2"/>
+              <p:cNvSpPr txBox="1"/>
+              <p:nvPr/>
+            </p:nvSpPr>
+            <p:spPr>
+              <a:xfrm>
+                <a:off x="5165766" y="4744193"/>
+                <a:ext cx="1872949" cy="338554"/>
+              </a:xfrm>
+              <a:prstGeom prst="rect">
+                <a:avLst/>
+              </a:prstGeom>
+              <a:noFill/>
+            </p:spPr>
+            <p:txBody>
+              <a:bodyPr wrap="none" rtlCol="0">
+                <a:spAutoFit/>
+              </a:bodyPr>
+              <a:lstStyle/>
+              <a:p>
+                <a:r>
+                  <a:rPr lang="en-US" sz="1600" dirty="0" smtClean="0"/>
+                  <a:t>Northern Subcluster</a:t>
+                </a:r>
+                <a:endParaRPr lang="en-US" sz="1600" dirty="0"/>
+              </a:p>
+            </p:txBody>
+          </p:sp>
+          <p:sp>
+            <p:nvSpPr>
+              <p:cNvPr id="5" name="Line Callout 2 (Accent Bar) 4"/>
+              <p:cNvSpPr/>
+              <p:nvPr/>
+            </p:nvSpPr>
+            <p:spPr>
+              <a:xfrm>
+                <a:off x="2489712" y="4077725"/>
+                <a:ext cx="914400" cy="457200"/>
+              </a:xfrm>
+              <a:prstGeom prst="accentCallout2">
+                <a:avLst>
+                  <a:gd name="adj1" fmla="val 18750"/>
+                  <a:gd name="adj2" fmla="val 105100"/>
+                  <a:gd name="adj3" fmla="val 18846"/>
+                  <a:gd name="adj4" fmla="val 113499"/>
+                  <a:gd name="adj5" fmla="val -102398"/>
+                  <a:gd name="adj6" fmla="val 148875"/>
+                </a:avLst>
+              </a:prstGeom>
+              <a:noFill/>
+              <a:ln>
+                <a:solidFill>
+                  <a:schemeClr val="accent2"/>
+                </a:solidFill>
+              </a:ln>
+            </p:spPr>
+            <p:style>
+              <a:lnRef idx="2">
+                <a:schemeClr val="accent1">
+                  <a:shade val="50000"/>
+                </a:schemeClr>
+              </a:lnRef>
+              <a:fillRef idx="1">
+                <a:schemeClr val="accent1"/>
+              </a:fillRef>
+              <a:effectRef idx="0">
+                <a:schemeClr val="accent1"/>
+              </a:effectRef>
+              <a:fontRef idx="minor">
+                <a:schemeClr val="lt1"/>
+              </a:fontRef>
+            </p:style>
+            <p:txBody>
+              <a:bodyPr rtlCol="0" anchor="ctr"/>
+              <a:lstStyle/>
+              <a:p>
+                <a:pPr algn="r"/>
+                <a:r>
+                  <a:rPr lang="en-US" sz="1600" dirty="0" smtClean="0">
+                    <a:solidFill>
+                      <a:schemeClr val="accent2"/>
+                    </a:solidFill>
+                  </a:rPr>
+                  <a:t>Galaxy</a:t>
+                </a:r>
+              </a:p>
+              <a:p>
+                <a:pPr algn="r"/>
+                <a:r>
+                  <a:rPr lang="en-US" sz="1600" dirty="0" smtClean="0">
+                    <a:solidFill>
+                      <a:schemeClr val="accent2"/>
+                    </a:solidFill>
+                  </a:rPr>
+                  <a:t>Centroid</a:t>
+                </a:r>
+                <a:endParaRPr lang="en-US" sz="1600" dirty="0">
+                  <a:solidFill>
+                    <a:schemeClr val="accent2"/>
+                  </a:solidFill>
+                </a:endParaRPr>
+              </a:p>
+            </p:txBody>
+          </p:sp>
+          <p:sp>
+            <p:nvSpPr>
+              <p:cNvPr id="6" name="Line Callout 2 (Accent Bar) 5"/>
+              <p:cNvSpPr/>
+              <p:nvPr/>
+            </p:nvSpPr>
+            <p:spPr>
+              <a:xfrm>
+                <a:off x="2553046" y="1742243"/>
+                <a:ext cx="914400" cy="457200"/>
+              </a:xfrm>
+              <a:prstGeom prst="accentCallout2">
+                <a:avLst>
+                  <a:gd name="adj1" fmla="val 18750"/>
+                  <a:gd name="adj2" fmla="val 105100"/>
+                  <a:gd name="adj3" fmla="val 18846"/>
+                  <a:gd name="adj4" fmla="val 113499"/>
+                  <a:gd name="adj5" fmla="val 178445"/>
+                  <a:gd name="adj6" fmla="val 174199"/>
+                </a:avLst>
+              </a:prstGeom>
+              <a:noFill/>
+              <a:ln>
+                <a:solidFill>
+                  <a:schemeClr val="accent1"/>
+                </a:solidFill>
+              </a:ln>
+            </p:spPr>
+            <p:style>
+              <a:lnRef idx="2">
+                <a:schemeClr val="accent1">
+                  <a:shade val="50000"/>
+                </a:schemeClr>
+              </a:lnRef>
+              <a:fillRef idx="1">
+                <a:schemeClr val="accent1"/>
+              </a:fillRef>
+              <a:effectRef idx="0">
+                <a:schemeClr val="accent1"/>
+              </a:effectRef>
+              <a:fontRef idx="minor">
+                <a:schemeClr val="lt1"/>
+              </a:fontRef>
+            </p:style>
+            <p:txBody>
+              <a:bodyPr rtlCol="0" anchor="ctr"/>
+              <a:lstStyle/>
+              <a:p>
+                <a:pPr algn="r"/>
+                <a:r>
+                  <a:rPr lang="en-US" sz="1600" dirty="0" smtClean="0">
+                    <a:solidFill>
+                      <a:schemeClr val="accent1"/>
+                    </a:solidFill>
+                  </a:rPr>
+                  <a:t>Lensing</a:t>
+                </a:r>
+              </a:p>
+              <a:p>
+                <a:pPr algn="r"/>
+                <a:r>
+                  <a:rPr lang="en-US" sz="1600" dirty="0" smtClean="0">
+                    <a:solidFill>
+                      <a:schemeClr val="accent1"/>
+                    </a:solidFill>
+                  </a:rPr>
+                  <a:t>Centroid</a:t>
+                </a:r>
+                <a:endParaRPr lang="en-US" sz="1600" dirty="0">
+                  <a:solidFill>
+                    <a:schemeClr val="accent1"/>
+                  </a:solidFill>
+                </a:endParaRPr>
+              </a:p>
+            </p:txBody>
+          </p:sp>
+        </p:grpSp>
+        <p:cxnSp>
+          <p:nvCxnSpPr>
+            <p:cNvPr id="8" name="Straight Connector 7"/>
+            <p:cNvCxnSpPr/>
+            <p:nvPr/>
+          </p:nvCxnSpPr>
+          <p:spPr>
+            <a:xfrm flipV="1">
+              <a:off x="3734790" y="1318160"/>
+              <a:ext cx="1453896" cy="3758184"/>
+            </a:xfrm>
+            <a:prstGeom prst="line">
               <a:avLst/>
             </a:prstGeom>
-            <a:noFill/>
-            <a:extLst>
-              <a:ext uri="{909E8E84-426E-40DD-AFC4-6F175D3DCCD1}">
-                <a14:hiddenFill xmlns:a14="http://schemas.microsoft.com/office/drawing/2010/main">
-                  <a:solidFill>
-                    <a:srgbClr val="FFFFFF"/>
-                  </a:solidFill>
-                </a14:hiddenFill>
-              </a:ext>
-            </a:extLst>
+            <a:ln w="19050">
+              <a:solidFill>
+                <a:schemeClr val="accent4"/>
+              </a:solidFill>
+              <a:prstDash val="dash"/>
+            </a:ln>
           </p:spPr>
-        </p:pic>
+          <p:style>
+            <a:lnRef idx="1">
+              <a:schemeClr val="accent1"/>
+            </a:lnRef>
+            <a:fillRef idx="0">
+              <a:schemeClr val="accent1"/>
+            </a:fillRef>
+            <a:effectRef idx="0">
+              <a:schemeClr val="accent1"/>
+            </a:effectRef>
+            <a:fontRef idx="minor">
+              <a:schemeClr val="tx1"/>
+            </a:fontRef>
+          </p:style>
+        </p:cxnSp>
         <p:sp>
           <p:nvSpPr>
-            <p:cNvPr id="3" name="TextBox 2"/>
-            <p:cNvSpPr txBox="1"/>
-            <p:nvPr/>
-          </p:nvSpPr>
-          <p:spPr>
-            <a:xfrm>
-              <a:off x="5165766" y="4744193"/>
-              <a:ext cx="1872949" cy="338554"/>
-            </a:xfrm>
-            <a:prstGeom prst="rect">
-              <a:avLst/>
-            </a:prstGeom>
-            <a:noFill/>
-          </p:spPr>
-          <p:txBody>
-            <a:bodyPr wrap="none" rtlCol="0">
-              <a:spAutoFit/>
-            </a:bodyPr>
-            <a:lstStyle/>
-            <a:p>
-              <a:r>
-                <a:rPr lang="en-US" sz="1600" dirty="0" smtClean="0"/>
-                <a:t>Northern Subcluster</a:t>
-              </a:r>
-              <a:endParaRPr lang="en-US" sz="1600" dirty="0"/>
-            </a:p>
-          </p:txBody>
-        </p:sp>
-        <p:sp>
-          <p:nvSpPr>
-            <p:cNvPr id="5" name="Line Callout 2 (Accent Bar) 4"/>
+            <p:cNvPr id="9" name="Line Callout 2 (Accent Bar) 8"/>
             <p:cNvSpPr/>
             <p:nvPr/>
           </p:nvSpPr>
           <p:spPr>
             <a:xfrm>
-              <a:off x="2489712" y="4077725"/>
-              <a:ext cx="914400" cy="457200"/>
+              <a:off x="3420093" y="1385985"/>
+              <a:ext cx="1288326" cy="245660"/>
             </a:xfrm>
             <a:prstGeom prst="accentCallout2">
               <a:avLst>
                 <a:gd name="adj1" fmla="val 18750"/>
-                <a:gd name="adj2" fmla="val 105100"/>
+                <a:gd name="adj2" fmla="val 100491"/>
                 <a:gd name="adj3" fmla="val 18846"/>
-                <a:gd name="adj4" fmla="val 113499"/>
-                <a:gd name="adj5" fmla="val -102398"/>
-                <a:gd name="adj6" fmla="val 148875"/>
+                <a:gd name="adj4" fmla="val 108429"/>
+                <a:gd name="adj5" fmla="val 67659"/>
+                <a:gd name="adj6" fmla="val 129369"/>
               </a:avLst>
             </a:prstGeom>
             <a:noFill/>
-            <a:ln>
+            <a:ln w="12700">
               <a:solidFill>
-                <a:schemeClr val="accent2"/>
+                <a:schemeClr val="accent4"/>
               </a:solidFill>
+              <a:prstDash val="dash"/>
             </a:ln>
           </p:spPr>
           <p:style>
@@ -3388,211 +3592,22 @@
             <a:p>
               <a:pPr algn="r"/>
               <a:r>
-                <a:rPr lang="en-US" sz="1600" dirty="0" smtClean="0">
+                <a:rPr lang="en-US" sz="1400" dirty="0" smtClean="0">
                   <a:solidFill>
-                    <a:schemeClr val="accent2"/>
+                    <a:schemeClr val="accent4"/>
                   </a:solidFill>
                 </a:rPr>
-                <a:t>Galaxy</a:t>
+                <a:t>Merger Axis</a:t>
               </a:r>
-            </a:p>
-            <a:p>
-              <a:pPr algn="r"/>
-              <a:r>
-                <a:rPr lang="en-US" sz="1600" dirty="0" smtClean="0">
-                  <a:solidFill>
-                    <a:schemeClr val="accent2"/>
-                  </a:solidFill>
-                </a:rPr>
-                <a:t>Centroid</a:t>
-              </a:r>
-              <a:endParaRPr lang="en-US" sz="1600" dirty="0">
+              <a:endParaRPr lang="en-US" sz="1400" dirty="0">
                 <a:solidFill>
-                  <a:schemeClr val="accent2"/>
-                </a:solidFill>
-              </a:endParaRPr>
-            </a:p>
-          </p:txBody>
-        </p:sp>
-        <p:sp>
-          <p:nvSpPr>
-            <p:cNvPr id="6" name="Line Callout 2 (Accent Bar) 5"/>
-            <p:cNvSpPr/>
-            <p:nvPr/>
-          </p:nvSpPr>
-          <p:spPr>
-            <a:xfrm>
-              <a:off x="2553046" y="1742243"/>
-              <a:ext cx="914400" cy="457200"/>
-            </a:xfrm>
-            <a:prstGeom prst="accentCallout2">
-              <a:avLst>
-                <a:gd name="adj1" fmla="val 18750"/>
-                <a:gd name="adj2" fmla="val 105100"/>
-                <a:gd name="adj3" fmla="val 18846"/>
-                <a:gd name="adj4" fmla="val 113499"/>
-                <a:gd name="adj5" fmla="val 178445"/>
-                <a:gd name="adj6" fmla="val 174199"/>
-              </a:avLst>
-            </a:prstGeom>
-            <a:noFill/>
-            <a:ln>
-              <a:solidFill>
-                <a:schemeClr val="accent1"/>
-              </a:solidFill>
-            </a:ln>
-          </p:spPr>
-          <p:style>
-            <a:lnRef idx="2">
-              <a:schemeClr val="accent1">
-                <a:shade val="50000"/>
-              </a:schemeClr>
-            </a:lnRef>
-            <a:fillRef idx="1">
-              <a:schemeClr val="accent1"/>
-            </a:fillRef>
-            <a:effectRef idx="0">
-              <a:schemeClr val="accent1"/>
-            </a:effectRef>
-            <a:fontRef idx="minor">
-              <a:schemeClr val="lt1"/>
-            </a:fontRef>
-          </p:style>
-          <p:txBody>
-            <a:bodyPr rtlCol="0" anchor="ctr"/>
-            <a:lstStyle/>
-            <a:p>
-              <a:pPr algn="r"/>
-              <a:r>
-                <a:rPr lang="en-US" sz="1600" dirty="0" smtClean="0">
-                  <a:solidFill>
-                    <a:schemeClr val="accent1"/>
-                  </a:solidFill>
-                </a:rPr>
-                <a:t>Lensing</a:t>
-              </a:r>
-            </a:p>
-            <a:p>
-              <a:pPr algn="r"/>
-              <a:r>
-                <a:rPr lang="en-US" sz="1600" dirty="0" smtClean="0">
-                  <a:solidFill>
-                    <a:schemeClr val="accent1"/>
-                  </a:solidFill>
-                </a:rPr>
-                <a:t>Centroid</a:t>
-              </a:r>
-              <a:endParaRPr lang="en-US" sz="1600" dirty="0">
-                <a:solidFill>
-                  <a:schemeClr val="accent1"/>
+                  <a:schemeClr val="accent4"/>
                 </a:solidFill>
               </a:endParaRPr>
             </a:p>
           </p:txBody>
         </p:sp>
       </p:grpSp>
-      <p:cxnSp>
-        <p:nvCxnSpPr>
-          <p:cNvPr id="8" name="Straight Connector 7"/>
-          <p:cNvCxnSpPr/>
-          <p:nvPr/>
-        </p:nvCxnSpPr>
-        <p:spPr>
-          <a:xfrm flipV="1">
-            <a:off x="3734790" y="1318160"/>
-            <a:ext cx="1453896" cy="3758184"/>
-          </a:xfrm>
-          <a:prstGeom prst="line">
-            <a:avLst/>
-          </a:prstGeom>
-          <a:ln w="19050">
-            <a:solidFill>
-              <a:schemeClr val="accent4"/>
-            </a:solidFill>
-            <a:prstDash val="dash"/>
-          </a:ln>
-        </p:spPr>
-        <p:style>
-          <a:lnRef idx="1">
-            <a:schemeClr val="accent1"/>
-          </a:lnRef>
-          <a:fillRef idx="0">
-            <a:schemeClr val="accent1"/>
-          </a:fillRef>
-          <a:effectRef idx="0">
-            <a:schemeClr val="accent1"/>
-          </a:effectRef>
-          <a:fontRef idx="minor">
-            <a:schemeClr val="tx1"/>
-          </a:fontRef>
-        </p:style>
-      </p:cxnSp>
-      <p:sp>
-        <p:nvSpPr>
-          <p:cNvPr id="9" name="Line Callout 2 (Accent Bar) 8"/>
-          <p:cNvSpPr/>
-          <p:nvPr/>
-        </p:nvSpPr>
-        <p:spPr>
-          <a:xfrm>
-            <a:off x="3420093" y="1385985"/>
-            <a:ext cx="1288326" cy="245660"/>
-          </a:xfrm>
-          <a:prstGeom prst="accentCallout2">
-            <a:avLst>
-              <a:gd name="adj1" fmla="val 18750"/>
-              <a:gd name="adj2" fmla="val 100491"/>
-              <a:gd name="adj3" fmla="val 18846"/>
-              <a:gd name="adj4" fmla="val 108429"/>
-              <a:gd name="adj5" fmla="val 67659"/>
-              <a:gd name="adj6" fmla="val 129369"/>
-            </a:avLst>
-          </a:prstGeom>
-          <a:noFill/>
-          <a:ln w="12700">
-            <a:solidFill>
-              <a:schemeClr val="accent4"/>
-            </a:solidFill>
-            <a:prstDash val="dash"/>
-          </a:ln>
-        </p:spPr>
-        <p:style>
-          <a:lnRef idx="2">
-            <a:schemeClr val="accent1">
-              <a:shade val="50000"/>
-            </a:schemeClr>
-          </a:lnRef>
-          <a:fillRef idx="1">
-            <a:schemeClr val="accent1"/>
-          </a:fillRef>
-          <a:effectRef idx="0">
-            <a:schemeClr val="accent1"/>
-          </a:effectRef>
-          <a:fontRef idx="minor">
-            <a:schemeClr val="lt1"/>
-          </a:fontRef>
-        </p:style>
-        <p:txBody>
-          <a:bodyPr rtlCol="0" anchor="ctr"/>
-          <a:lstStyle/>
-          <a:p>
-            <a:pPr algn="r"/>
-            <a:r>
-              <a:rPr lang="en-US" sz="1400" dirty="0" smtClean="0">
-                <a:solidFill>
-                  <a:schemeClr val="accent4"/>
-                </a:solidFill>
-              </a:rPr>
-              <a:t>Merger Axis</a:t>
-            </a:r>
-            <a:endParaRPr lang="en-US" sz="1400" dirty="0">
-              <a:solidFill>
-                <a:schemeClr val="accent4"/>
-              </a:solidFill>
-            </a:endParaRPr>
-          </a:p>
-        </p:txBody>
-      </p:sp>
     </p:spTree>
     <p:extLst>
       <p:ext uri="{BB962C8B-B14F-4D97-AF65-F5344CB8AC3E}">

</xml_diff>

<commit_message>
created an X-ray plot for Chapter 4
</commit_message>
<xml_diff>
--- a/Chapter4/AnalysisFiles/Reformatted Figures.pptx
+++ b/Chapter4/AnalysisFiles/Reformatted Figures.pptx
@@ -6,10 +6,11 @@
   </p:sldMasterIdLst>
   <p:sldIdLst>
     <p:sldId id="256" r:id="rId2"/>
-    <p:sldId id="257" r:id="rId3"/>
-    <p:sldId id="258" r:id="rId4"/>
-    <p:sldId id="259" r:id="rId5"/>
-    <p:sldId id="260" r:id="rId6"/>
+    <p:sldId id="261" r:id="rId3"/>
+    <p:sldId id="257" r:id="rId4"/>
+    <p:sldId id="258" r:id="rId5"/>
+    <p:sldId id="259" r:id="rId6"/>
+    <p:sldId id="260" r:id="rId7"/>
   </p:sldIdLst>
   <p:sldSz cx="9144000" cy="6858000" type="screen4x3"/>
   <p:notesSz cx="6858000" cy="9144000"/>
@@ -292,7 +293,7 @@
           <a:p>
             <a:fld id="{6BED7B28-07E3-435C-93B6-8F423A08B503}" type="datetimeFigureOut">
               <a:rPr lang="en-US" smtClean="0"/>
-              <a:t>8/15/2013</a:t>
+              <a:t>8/16/2013</a:t>
             </a:fld>
             <a:endParaRPr lang="en-US"/>
           </a:p>
@@ -462,7 +463,7 @@
           <a:p>
             <a:fld id="{6BED7B28-07E3-435C-93B6-8F423A08B503}" type="datetimeFigureOut">
               <a:rPr lang="en-US" smtClean="0"/>
-              <a:t>8/15/2013</a:t>
+              <a:t>8/16/2013</a:t>
             </a:fld>
             <a:endParaRPr lang="en-US"/>
           </a:p>
@@ -642,7 +643,7 @@
           <a:p>
             <a:fld id="{6BED7B28-07E3-435C-93B6-8F423A08B503}" type="datetimeFigureOut">
               <a:rPr lang="en-US" smtClean="0"/>
-              <a:t>8/15/2013</a:t>
+              <a:t>8/16/2013</a:t>
             </a:fld>
             <a:endParaRPr lang="en-US"/>
           </a:p>
@@ -812,7 +813,7 @@
           <a:p>
             <a:fld id="{6BED7B28-07E3-435C-93B6-8F423A08B503}" type="datetimeFigureOut">
               <a:rPr lang="en-US" smtClean="0"/>
-              <a:t>8/15/2013</a:t>
+              <a:t>8/16/2013</a:t>
             </a:fld>
             <a:endParaRPr lang="en-US"/>
           </a:p>
@@ -1058,7 +1059,7 @@
           <a:p>
             <a:fld id="{6BED7B28-07E3-435C-93B6-8F423A08B503}" type="datetimeFigureOut">
               <a:rPr lang="en-US" smtClean="0"/>
-              <a:t>8/15/2013</a:t>
+              <a:t>8/16/2013</a:t>
             </a:fld>
             <a:endParaRPr lang="en-US"/>
           </a:p>
@@ -1346,7 +1347,7 @@
           <a:p>
             <a:fld id="{6BED7B28-07E3-435C-93B6-8F423A08B503}" type="datetimeFigureOut">
               <a:rPr lang="en-US" smtClean="0"/>
-              <a:t>8/15/2013</a:t>
+              <a:t>8/16/2013</a:t>
             </a:fld>
             <a:endParaRPr lang="en-US"/>
           </a:p>
@@ -1768,7 +1769,7 @@
           <a:p>
             <a:fld id="{6BED7B28-07E3-435C-93B6-8F423A08B503}" type="datetimeFigureOut">
               <a:rPr lang="en-US" smtClean="0"/>
-              <a:t>8/15/2013</a:t>
+              <a:t>8/16/2013</a:t>
             </a:fld>
             <a:endParaRPr lang="en-US"/>
           </a:p>
@@ -1886,7 +1887,7 @@
           <a:p>
             <a:fld id="{6BED7B28-07E3-435C-93B6-8F423A08B503}" type="datetimeFigureOut">
               <a:rPr lang="en-US" smtClean="0"/>
-              <a:t>8/15/2013</a:t>
+              <a:t>8/16/2013</a:t>
             </a:fld>
             <a:endParaRPr lang="en-US"/>
           </a:p>
@@ -1981,7 +1982,7 @@
           <a:p>
             <a:fld id="{6BED7B28-07E3-435C-93B6-8F423A08B503}" type="datetimeFigureOut">
               <a:rPr lang="en-US" smtClean="0"/>
-              <a:t>8/15/2013</a:t>
+              <a:t>8/16/2013</a:t>
             </a:fld>
             <a:endParaRPr lang="en-US"/>
           </a:p>
@@ -2258,7 +2259,7 @@
           <a:p>
             <a:fld id="{6BED7B28-07E3-435C-93B6-8F423A08B503}" type="datetimeFigureOut">
               <a:rPr lang="en-US" smtClean="0"/>
-              <a:t>8/15/2013</a:t>
+              <a:t>8/16/2013</a:t>
             </a:fld>
             <a:endParaRPr lang="en-US"/>
           </a:p>
@@ -2511,7 +2512,7 @@
           <a:p>
             <a:fld id="{6BED7B28-07E3-435C-93B6-8F423A08B503}" type="datetimeFigureOut">
               <a:rPr lang="en-US" smtClean="0"/>
-              <a:t>8/15/2013</a:t>
+              <a:t>8/16/2013</a:t>
             </a:fld>
             <a:endParaRPr lang="en-US"/>
           </a:p>
@@ -2724,7 +2725,7 @@
           <a:p>
             <a:fld id="{6BED7B28-07E3-435C-93B6-8F423A08B503}" type="datetimeFigureOut">
               <a:rPr lang="en-US" smtClean="0"/>
-              <a:t>8/15/2013</a:t>
+              <a:t>8/16/2013</a:t>
             </a:fld>
             <a:endParaRPr lang="en-US"/>
           </a:p>
@@ -3255,6 +3256,212 @@
       </p:grpSpPr>
       <p:grpSp>
         <p:nvGrpSpPr>
+          <p:cNvPr id="5" name="Group 4"/>
+          <p:cNvGrpSpPr/>
+          <p:nvPr/>
+        </p:nvGrpSpPr>
+        <p:grpSpPr>
+          <a:xfrm>
+            <a:off x="2411626" y="1104407"/>
+            <a:ext cx="4832322" cy="4476331"/>
+            <a:chOff x="2411626" y="1104407"/>
+            <a:chExt cx="4832322" cy="4476331"/>
+          </a:xfrm>
+        </p:grpSpPr>
+        <p:pic>
+          <p:nvPicPr>
+            <p:cNvPr id="1027" name="Picture 3" descr="C:\Users\WILLDA~1\AppData\Local\Temp\VMwareDnD\9a81e5ec\XrayMapwithCentNReg.png"/>
+            <p:cNvPicPr>
+              <a:picLocks noChangeAspect="1" noChangeArrowheads="1"/>
+            </p:cNvPicPr>
+            <p:nvPr/>
+          </p:nvPicPr>
+          <p:blipFill>
+            <a:blip r:embed="rId2">
+              <a:extLst>
+                <a:ext uri="{28A0092B-C50C-407E-A947-70E740481C1C}">
+                  <a14:useLocalDpi xmlns:a14="http://schemas.microsoft.com/office/drawing/2010/main" val="0"/>
+                </a:ext>
+              </a:extLst>
+            </a:blip>
+            <a:srcRect/>
+            <a:stretch>
+              <a:fillRect/>
+            </a:stretch>
+          </p:blipFill>
+          <p:spPr bwMode="auto">
+            <a:xfrm>
+              <a:off x="2411626" y="1104407"/>
+              <a:ext cx="4572000" cy="4476331"/>
+            </a:xfrm>
+            <a:prstGeom prst="rect">
+              <a:avLst/>
+            </a:prstGeom>
+            <a:noFill/>
+            <a:extLst>
+              <a:ext uri="{909E8E84-426E-40DD-AFC4-6F175D3DCCD1}">
+                <a14:hiddenFill xmlns:a14="http://schemas.microsoft.com/office/drawing/2010/main">
+                  <a:solidFill>
+                    <a:srgbClr val="FFFFFF"/>
+                  </a:solidFill>
+                </a14:hiddenFill>
+              </a:ext>
+            </a:extLst>
+          </p:spPr>
+        </p:pic>
+        <p:sp>
+          <p:nvSpPr>
+            <p:cNvPr id="2" name="Line Callout 2 (Accent Bar) 1"/>
+            <p:cNvSpPr/>
+            <p:nvPr/>
+          </p:nvSpPr>
+          <p:spPr>
+            <a:xfrm>
+              <a:off x="5468587" y="2196934"/>
+              <a:ext cx="1306285" cy="397823"/>
+            </a:xfrm>
+            <a:prstGeom prst="accentCallout2">
+              <a:avLst>
+                <a:gd name="adj1" fmla="val 18750"/>
+                <a:gd name="adj2" fmla="val -8333"/>
+                <a:gd name="adj3" fmla="val 18750"/>
+                <a:gd name="adj4" fmla="val -16667"/>
+                <a:gd name="adj5" fmla="val 109813"/>
+                <a:gd name="adj6" fmla="val -48430"/>
+              </a:avLst>
+            </a:prstGeom>
+            <a:noFill/>
+            <a:ln>
+              <a:solidFill>
+                <a:srgbClr val="00CC00"/>
+              </a:solidFill>
+            </a:ln>
+          </p:spPr>
+          <p:style>
+            <a:lnRef idx="2">
+              <a:schemeClr val="accent1">
+                <a:shade val="50000"/>
+              </a:schemeClr>
+            </a:lnRef>
+            <a:fillRef idx="1">
+              <a:schemeClr val="accent1"/>
+            </a:fillRef>
+            <a:effectRef idx="0">
+              <a:schemeClr val="accent1"/>
+            </a:effectRef>
+            <a:fontRef idx="minor">
+              <a:schemeClr val="lt1"/>
+            </a:fontRef>
+          </p:style>
+          <p:txBody>
+            <a:bodyPr rtlCol="0" anchor="ctr"/>
+            <a:lstStyle/>
+            <a:p>
+              <a:r>
+                <a:rPr lang="en-US" sz="1400" dirty="0" smtClean="0">
+                  <a:solidFill>
+                    <a:srgbClr val="00CC00"/>
+                  </a:solidFill>
+                </a:rPr>
+                <a:t>Gas centroid analysis region</a:t>
+              </a:r>
+              <a:endParaRPr lang="en-US" sz="1400" dirty="0">
+                <a:solidFill>
+                  <a:srgbClr val="00CC00"/>
+                </a:solidFill>
+              </a:endParaRPr>
+            </a:p>
+          </p:txBody>
+        </p:sp>
+        <p:sp>
+          <p:nvSpPr>
+            <p:cNvPr id="4" name="Line Callout 2 (Accent Bar) 3"/>
+            <p:cNvSpPr/>
+            <p:nvPr/>
+          </p:nvSpPr>
+          <p:spPr>
+            <a:xfrm>
+              <a:off x="5486400" y="3788227"/>
+              <a:ext cx="1757548" cy="368135"/>
+            </a:xfrm>
+            <a:prstGeom prst="accentCallout2">
+              <a:avLst>
+                <a:gd name="adj1" fmla="val 18750"/>
+                <a:gd name="adj2" fmla="val -8333"/>
+                <a:gd name="adj3" fmla="val 18750"/>
+                <a:gd name="adj4" fmla="val -16667"/>
+                <a:gd name="adj5" fmla="val -183318"/>
+                <a:gd name="adj6" fmla="val -61173"/>
+              </a:avLst>
+            </a:prstGeom>
+            <a:noFill/>
+            <a:ln>
+              <a:solidFill>
+                <a:schemeClr val="bg1"/>
+              </a:solidFill>
+            </a:ln>
+          </p:spPr>
+          <p:style>
+            <a:lnRef idx="2">
+              <a:schemeClr val="accent1">
+                <a:shade val="50000"/>
+              </a:schemeClr>
+            </a:lnRef>
+            <a:fillRef idx="1">
+              <a:schemeClr val="accent1"/>
+            </a:fillRef>
+            <a:effectRef idx="0">
+              <a:schemeClr val="accent1"/>
+            </a:effectRef>
+            <a:fontRef idx="minor">
+              <a:schemeClr val="lt1"/>
+            </a:fontRef>
+          </p:style>
+          <p:txBody>
+            <a:bodyPr rtlCol="0" anchor="ctr"/>
+            <a:lstStyle/>
+            <a:p>
+              <a:r>
+                <a:rPr lang="en-US" sz="1400" dirty="0" smtClean="0"/>
+                <a:t>X-ray centroid and confidence limits</a:t>
+              </a:r>
+              <a:endParaRPr lang="en-US" sz="1400" dirty="0"/>
+            </a:p>
+          </p:txBody>
+        </p:sp>
+      </p:grpSp>
+    </p:spTree>
+    <p:extLst>
+      <p:ext uri="{BB962C8B-B14F-4D97-AF65-F5344CB8AC3E}">
+        <p14:creationId xmlns:p14="http://schemas.microsoft.com/office/powerpoint/2010/main" val="1487586363"/>
+      </p:ext>
+    </p:extLst>
+  </p:cSld>
+  <p:clrMapOvr>
+    <a:masterClrMapping/>
+  </p:clrMapOvr>
+</p:sld>
+</file>
+
+<file path=ppt/slides/slide3.xml><?xml version="1.0" encoding="utf-8"?>
+<p:sld xmlns:a="http://schemas.openxmlformats.org/drawingml/2006/main" xmlns:r="http://schemas.openxmlformats.org/officeDocument/2006/relationships" xmlns:p="http://schemas.openxmlformats.org/presentationml/2006/main">
+  <p:cSld>
+    <p:spTree>
+      <p:nvGrpSpPr>
+        <p:cNvPr id="1" name=""/>
+        <p:cNvGrpSpPr/>
+        <p:nvPr/>
+      </p:nvGrpSpPr>
+      <p:grpSpPr>
+        <a:xfrm>
+          <a:off x="0" y="0"/>
+          <a:ext cx="0" cy="0"/>
+          <a:chOff x="0" y="0"/>
+          <a:chExt cx="0" cy="0"/>
+        </a:xfrm>
+      </p:grpSpPr>
+      <p:grpSp>
+        <p:nvGrpSpPr>
           <p:cNvPr id="7" name="Group 6"/>
           <p:cNvGrpSpPr/>
           <p:nvPr/>
@@ -3621,7 +3828,7 @@
 </p:sld>
 </file>
 
-<file path=ppt/slides/slide3.xml><?xml version="1.0" encoding="utf-8"?>
+<file path=ppt/slides/slide4.xml><?xml version="1.0" encoding="utf-8"?>
 <p:sld xmlns:a="http://schemas.openxmlformats.org/drawingml/2006/main" xmlns:r="http://schemas.openxmlformats.org/officeDocument/2006/relationships" xmlns:p="http://schemas.openxmlformats.org/presentationml/2006/main">
   <p:cSld>
     <p:spTree>
@@ -4121,7 +4328,7 @@
 </p:sld>
 </file>
 
-<file path=ppt/slides/slide4.xml><?xml version="1.0" encoding="utf-8"?>
+<file path=ppt/slides/slide5.xml><?xml version="1.0" encoding="utf-8"?>
 <p:sld xmlns:a="http://schemas.openxmlformats.org/drawingml/2006/main" xmlns:r="http://schemas.openxmlformats.org/officeDocument/2006/relationships" xmlns:p="http://schemas.openxmlformats.org/presentationml/2006/main">
   <p:cSld>
     <p:spTree>
@@ -4243,7 +4450,7 @@
 </p:sld>
 </file>
 
-<file path=ppt/slides/slide5.xml><?xml version="1.0" encoding="utf-8"?>
+<file path=ppt/slides/slide6.xml><?xml version="1.0" encoding="utf-8"?>
 <p:sld xmlns:a="http://schemas.openxmlformats.org/drawingml/2006/main" xmlns:r="http://schemas.openxmlformats.org/officeDocument/2006/relationships" xmlns:p="http://schemas.openxmlformats.org/presentationml/2006/main">
   <p:cSld>
     <p:spTree>

</xml_diff>

<commit_message>
Created several weak lensing figures comparing various distributions.
</commit_message>
<xml_diff>
--- a/Chapter4/AnalysisFiles/Reformatted Figures.pptx
+++ b/Chapter4/AnalysisFiles/Reformatted Figures.pptx
@@ -7,10 +7,12 @@
   <p:sldIdLst>
     <p:sldId id="256" r:id="rId2"/>
     <p:sldId id="261" r:id="rId3"/>
-    <p:sldId id="257" r:id="rId4"/>
-    <p:sldId id="258" r:id="rId5"/>
-    <p:sldId id="259" r:id="rId6"/>
-    <p:sldId id="260" r:id="rId7"/>
+    <p:sldId id="263" r:id="rId4"/>
+    <p:sldId id="265" r:id="rId5"/>
+    <p:sldId id="257" r:id="rId6"/>
+    <p:sldId id="258" r:id="rId7"/>
+    <p:sldId id="259" r:id="rId8"/>
+    <p:sldId id="260" r:id="rId9"/>
   </p:sldIdLst>
   <p:sldSz cx="9144000" cy="6858000" type="screen4x3"/>
   <p:notesSz cx="6858000" cy="9144000"/>
@@ -109,6 +111,22 @@
       </a:defRPr>
     </a:lvl9pPr>
   </p:defaultTextStyle>
+  <p:extLst>
+    <p:ext uri="{EFAFB233-063F-42B5-8137-9DF3F51BA10A}">
+      <p15:sldGuideLst xmlns:p15="http://schemas.microsoft.com/office/powerpoint/2012/main">
+        <p15:guide id="1" orient="horz" pos="2160">
+          <p15:clr>
+            <a:srgbClr val="A4A3A4"/>
+          </p15:clr>
+        </p15:guide>
+        <p15:guide id="2" pos="2880">
+          <p15:clr>
+            <a:srgbClr val="A4A3A4"/>
+          </p15:clr>
+        </p15:guide>
+      </p15:sldGuideLst>
+    </p:ext>
+  </p:extLst>
 </p:presentation>
 </file>
 
@@ -3462,6 +3480,720 @@
       </p:grpSpPr>
       <p:grpSp>
         <p:nvGrpSpPr>
+          <p:cNvPr id="3" name="Group 2"/>
+          <p:cNvGrpSpPr/>
+          <p:nvPr/>
+        </p:nvGrpSpPr>
+        <p:grpSpPr>
+          <a:xfrm>
+            <a:off x="1052467" y="-120213"/>
+            <a:ext cx="7829451" cy="6978213"/>
+            <a:chOff x="1052467" y="-120213"/>
+            <a:chExt cx="7829451" cy="6978213"/>
+          </a:xfrm>
+        </p:grpSpPr>
+        <p:pic>
+          <p:nvPicPr>
+            <p:cNvPr id="14" name="Picture 13"/>
+            <p:cNvPicPr>
+              <a:picLocks noChangeAspect="1"/>
+            </p:cNvPicPr>
+            <p:nvPr/>
+          </p:nvPicPr>
+          <p:blipFill rotWithShape="1">
+            <a:blip r:embed="rId2">
+              <a:extLst>
+                <a:ext uri="{28A0092B-C50C-407E-A947-70E740481C1C}">
+                  <a14:useLocalDpi xmlns:a14="http://schemas.microsoft.com/office/drawing/2010/main" val="0"/>
+                </a:ext>
+              </a:extLst>
+            </a:blip>
+            <a:srcRect l="8694" t="9938" r="9128" b="1921"/>
+            <a:stretch/>
+          </p:blipFill>
+          <p:spPr>
+            <a:xfrm>
+              <a:off x="1460502" y="9143"/>
+              <a:ext cx="6418303" cy="6419088"/>
+            </a:xfrm>
+            <a:prstGeom prst="rect">
+              <a:avLst/>
+            </a:prstGeom>
+          </p:spPr>
+        </p:pic>
+        <p:pic>
+          <p:nvPicPr>
+            <p:cNvPr id="6" name="Picture 5"/>
+            <p:cNvPicPr>
+              <a:picLocks noChangeAspect="1"/>
+            </p:cNvPicPr>
+            <p:nvPr/>
+          </p:nvPicPr>
+          <p:blipFill>
+            <a:blip r:embed="rId3">
+              <a:clrChange>
+                <a:clrFrom>
+                  <a:srgbClr val="FFFFFF"/>
+                </a:clrFrom>
+                <a:clrTo>
+                  <a:srgbClr val="FFFFFF">
+                    <a:alpha val="0"/>
+                  </a:srgbClr>
+                </a:clrTo>
+              </a:clrChange>
+              <a:extLst>
+                <a:ext uri="{28A0092B-C50C-407E-A947-70E740481C1C}">
+                  <a14:useLocalDpi xmlns:a14="http://schemas.microsoft.com/office/drawing/2010/main" val="0"/>
+                </a:ext>
+              </a:extLst>
+            </a:blip>
+            <a:stretch>
+              <a:fillRect/>
+            </a:stretch>
+          </p:blipFill>
+          <p:spPr>
+            <a:xfrm>
+              <a:off x="1052467" y="-15269"/>
+              <a:ext cx="7022013" cy="6873269"/>
+            </a:xfrm>
+            <a:prstGeom prst="rect">
+              <a:avLst/>
+            </a:prstGeom>
+          </p:spPr>
+        </p:pic>
+        <p:grpSp>
+          <p:nvGrpSpPr>
+            <p:cNvPr id="16" name="Group 15"/>
+            <p:cNvGrpSpPr/>
+            <p:nvPr/>
+          </p:nvGrpSpPr>
+          <p:grpSpPr>
+            <a:xfrm>
+              <a:off x="8083111" y="-120213"/>
+              <a:ext cx="798807" cy="6677799"/>
+              <a:chOff x="3265715" y="62592"/>
+              <a:chExt cx="798807" cy="6677799"/>
+            </a:xfrm>
+          </p:grpSpPr>
+          <p:pic>
+            <p:nvPicPr>
+              <p:cNvPr id="17" name="Picture 16"/>
+              <p:cNvPicPr>
+                <a:picLocks noChangeAspect="1"/>
+              </p:cNvPicPr>
+              <p:nvPr/>
+            </p:nvPicPr>
+            <p:blipFill rotWithShape="1">
+              <a:blip r:embed="rId4">
+                <a:extLst>
+                  <a:ext uri="{28A0092B-C50C-407E-A947-70E740481C1C}">
+                    <a14:useLocalDpi xmlns:a14="http://schemas.microsoft.com/office/drawing/2010/main" val="0"/>
+                  </a:ext>
+                </a:extLst>
+              </a:blip>
+              <a:srcRect l="413" r="1" b="43333"/>
+              <a:stretch/>
+            </p:blipFill>
+            <p:spPr>
+              <a:xfrm rot="16200000">
+                <a:off x="239862" y="3187168"/>
+                <a:ext cx="6468085" cy="416379"/>
+              </a:xfrm>
+              <a:prstGeom prst="rect">
+                <a:avLst/>
+              </a:prstGeom>
+            </p:spPr>
+          </p:pic>
+          <p:sp>
+            <p:nvSpPr>
+              <p:cNvPr id="18" name="TextBox 17"/>
+              <p:cNvSpPr txBox="1"/>
+              <p:nvPr/>
+            </p:nvSpPr>
+            <p:spPr>
+              <a:xfrm>
+                <a:off x="3592285" y="1330778"/>
+                <a:ext cx="415498" cy="276999"/>
+              </a:xfrm>
+              <a:prstGeom prst="rect">
+                <a:avLst/>
+              </a:prstGeom>
+              <a:noFill/>
+            </p:spPr>
+            <p:txBody>
+              <a:bodyPr wrap="none" rtlCol="0">
+                <a:spAutoFit/>
+              </a:bodyPr>
+              <a:lstStyle/>
+              <a:p>
+                <a:r>
+                  <a:rPr lang="en-US" sz="1200" b="1" dirty="0">
+                    <a:latin typeface="Arial Rounded MT Bold" pitchFamily="34" charset="0"/>
+                    <a:cs typeface="Arial" pitchFamily="34" charset="0"/>
+                  </a:rPr>
+                  <a:t>4.5</a:t>
+                </a:r>
+              </a:p>
+            </p:txBody>
+          </p:sp>
+          <p:sp>
+            <p:nvSpPr>
+              <p:cNvPr id="19" name="TextBox 18"/>
+              <p:cNvSpPr txBox="1"/>
+              <p:nvPr/>
+            </p:nvSpPr>
+            <p:spPr>
+              <a:xfrm>
+                <a:off x="3589564" y="2626178"/>
+                <a:ext cx="415498" cy="276999"/>
+              </a:xfrm>
+              <a:prstGeom prst="rect">
+                <a:avLst/>
+              </a:prstGeom>
+              <a:noFill/>
+            </p:spPr>
+            <p:txBody>
+              <a:bodyPr wrap="none" rtlCol="0">
+                <a:spAutoFit/>
+              </a:bodyPr>
+              <a:lstStyle/>
+              <a:p>
+                <a:r>
+                  <a:rPr lang="en-US" sz="1200" b="1" dirty="0">
+                    <a:latin typeface="Arial Rounded MT Bold" pitchFamily="34" charset="0"/>
+                    <a:cs typeface="Arial" pitchFamily="34" charset="0"/>
+                  </a:rPr>
+                  <a:t>2.5</a:t>
+                </a:r>
+              </a:p>
+            </p:txBody>
+          </p:sp>
+          <p:sp>
+            <p:nvSpPr>
+              <p:cNvPr id="20" name="TextBox 19"/>
+              <p:cNvSpPr txBox="1"/>
+              <p:nvPr/>
+            </p:nvSpPr>
+            <p:spPr>
+              <a:xfrm>
+                <a:off x="3589563" y="3907971"/>
+                <a:ext cx="415498" cy="276999"/>
+              </a:xfrm>
+              <a:prstGeom prst="rect">
+                <a:avLst/>
+              </a:prstGeom>
+              <a:noFill/>
+            </p:spPr>
+            <p:txBody>
+              <a:bodyPr wrap="none" rtlCol="0">
+                <a:spAutoFit/>
+              </a:bodyPr>
+              <a:lstStyle/>
+              <a:p>
+                <a:r>
+                  <a:rPr lang="en-US" sz="1200" b="1" dirty="0">
+                    <a:latin typeface="Arial Rounded MT Bold" pitchFamily="34" charset="0"/>
+                    <a:cs typeface="Arial" pitchFamily="34" charset="0"/>
+                  </a:rPr>
+                  <a:t>0.5</a:t>
+                </a:r>
+              </a:p>
+            </p:txBody>
+          </p:sp>
+          <p:sp>
+            <p:nvSpPr>
+              <p:cNvPr id="21" name="TextBox 20"/>
+              <p:cNvSpPr txBox="1"/>
+              <p:nvPr/>
+            </p:nvSpPr>
+            <p:spPr>
+              <a:xfrm>
+                <a:off x="3597728" y="5214257"/>
+                <a:ext cx="466794" cy="276999"/>
+              </a:xfrm>
+              <a:prstGeom prst="rect">
+                <a:avLst/>
+              </a:prstGeom>
+              <a:noFill/>
+            </p:spPr>
+            <p:txBody>
+              <a:bodyPr wrap="none" rtlCol="0">
+                <a:spAutoFit/>
+              </a:bodyPr>
+              <a:lstStyle/>
+              <a:p>
+                <a:r>
+                  <a:rPr lang="en-US" sz="1200" b="1" dirty="0">
+                    <a:latin typeface="Arial Rounded MT Bold" pitchFamily="34" charset="0"/>
+                    <a:cs typeface="Arial" pitchFamily="34" charset="0"/>
+                  </a:rPr>
+                  <a:t>-1.5</a:t>
+                </a:r>
+              </a:p>
+            </p:txBody>
+          </p:sp>
+          <p:sp>
+            <p:nvSpPr>
+              <p:cNvPr id="22" name="TextBox 21"/>
+              <p:cNvSpPr txBox="1"/>
+              <p:nvPr/>
+            </p:nvSpPr>
+            <p:spPr>
+              <a:xfrm>
+                <a:off x="3589564" y="6463392"/>
+                <a:ext cx="466794" cy="276999"/>
+              </a:xfrm>
+              <a:prstGeom prst="rect">
+                <a:avLst/>
+              </a:prstGeom>
+              <a:noFill/>
+            </p:spPr>
+            <p:txBody>
+              <a:bodyPr wrap="none" rtlCol="0">
+                <a:spAutoFit/>
+              </a:bodyPr>
+              <a:lstStyle/>
+              <a:p>
+                <a:r>
+                  <a:rPr lang="en-US" sz="1200" b="1" dirty="0">
+                    <a:latin typeface="Arial Rounded MT Bold" pitchFamily="34" charset="0"/>
+                    <a:cs typeface="Arial" pitchFamily="34" charset="0"/>
+                  </a:rPr>
+                  <a:t>-3.5</a:t>
+                </a:r>
+              </a:p>
+            </p:txBody>
+          </p:sp>
+          <p:sp>
+            <p:nvSpPr>
+              <p:cNvPr id="23" name="TextBox 22"/>
+              <p:cNvSpPr txBox="1"/>
+              <p:nvPr/>
+            </p:nvSpPr>
+            <p:spPr>
+              <a:xfrm>
+                <a:off x="3597729" y="62592"/>
+                <a:ext cx="415498" cy="276999"/>
+              </a:xfrm>
+              <a:prstGeom prst="rect">
+                <a:avLst/>
+              </a:prstGeom>
+              <a:noFill/>
+            </p:spPr>
+            <p:txBody>
+              <a:bodyPr wrap="none" rtlCol="0">
+                <a:spAutoFit/>
+              </a:bodyPr>
+              <a:lstStyle/>
+              <a:p>
+                <a:r>
+                  <a:rPr lang="en-US" sz="1200" b="1" dirty="0">
+                    <a:latin typeface="Arial Rounded MT Bold" pitchFamily="34" charset="0"/>
+                    <a:cs typeface="Arial" pitchFamily="34" charset="0"/>
+                  </a:rPr>
+                  <a:t>6.5</a:t>
+                </a:r>
+              </a:p>
+            </p:txBody>
+          </p:sp>
+        </p:grpSp>
+      </p:grpSp>
+    </p:spTree>
+    <p:extLst>
+      <p:ext uri="{BB962C8B-B14F-4D97-AF65-F5344CB8AC3E}">
+        <p14:creationId xmlns:p14="http://schemas.microsoft.com/office/powerpoint/2010/main" val="723910351"/>
+      </p:ext>
+    </p:extLst>
+  </p:cSld>
+  <p:clrMapOvr>
+    <a:masterClrMapping/>
+  </p:clrMapOvr>
+  <p:timing>
+    <p:tnLst>
+      <p:par>
+        <p:cTn id="1" dur="indefinite" restart="never" nodeType="tmRoot"/>
+      </p:par>
+    </p:tnLst>
+  </p:timing>
+</p:sld>
+</file>
+
+<file path=ppt/slides/slide4.xml><?xml version="1.0" encoding="utf-8"?>
+<p:sld xmlns:a="http://schemas.openxmlformats.org/drawingml/2006/main" xmlns:r="http://schemas.openxmlformats.org/officeDocument/2006/relationships" xmlns:p="http://schemas.openxmlformats.org/presentationml/2006/main">
+  <p:cSld>
+    <p:spTree>
+      <p:nvGrpSpPr>
+        <p:cNvPr id="1" name=""/>
+        <p:cNvGrpSpPr/>
+        <p:nvPr/>
+      </p:nvGrpSpPr>
+      <p:grpSpPr>
+        <a:xfrm>
+          <a:off x="0" y="0"/>
+          <a:ext cx="0" cy="0"/>
+          <a:chOff x="0" y="0"/>
+          <a:chExt cx="0" cy="0"/>
+        </a:xfrm>
+      </p:grpSpPr>
+      <p:grpSp>
+        <p:nvGrpSpPr>
+          <p:cNvPr id="2" name="Group 1"/>
+          <p:cNvGrpSpPr/>
+          <p:nvPr/>
+        </p:nvGrpSpPr>
+        <p:grpSpPr>
+          <a:xfrm>
+            <a:off x="1052467" y="-120213"/>
+            <a:ext cx="7829451" cy="6978213"/>
+            <a:chOff x="1052467" y="-120213"/>
+            <a:chExt cx="7829451" cy="6978213"/>
+          </a:xfrm>
+        </p:grpSpPr>
+        <p:pic>
+          <p:nvPicPr>
+            <p:cNvPr id="13" name="Picture 12"/>
+            <p:cNvPicPr>
+              <a:picLocks noChangeAspect="1"/>
+            </p:cNvPicPr>
+            <p:nvPr/>
+          </p:nvPicPr>
+          <p:blipFill rotWithShape="1">
+            <a:blip r:embed="rId2">
+              <a:extLst>
+                <a:ext uri="{28A0092B-C50C-407E-A947-70E740481C1C}">
+                  <a14:useLocalDpi xmlns:a14="http://schemas.microsoft.com/office/drawing/2010/main" val="0"/>
+                </a:ext>
+              </a:extLst>
+            </a:blip>
+            <a:srcRect l="8713" t="9495" r="8860" b="1619"/>
+            <a:stretch/>
+          </p:blipFill>
+          <p:spPr>
+            <a:xfrm>
+              <a:off x="1445182" y="0"/>
+              <a:ext cx="6430289" cy="6426222"/>
+            </a:xfrm>
+            <a:prstGeom prst="rect">
+              <a:avLst/>
+            </a:prstGeom>
+          </p:spPr>
+        </p:pic>
+        <p:pic>
+          <p:nvPicPr>
+            <p:cNvPr id="6" name="Picture 5"/>
+            <p:cNvPicPr>
+              <a:picLocks noChangeAspect="1"/>
+            </p:cNvPicPr>
+            <p:nvPr/>
+          </p:nvPicPr>
+          <p:blipFill>
+            <a:blip r:embed="rId3">
+              <a:clrChange>
+                <a:clrFrom>
+                  <a:srgbClr val="FFFFFF"/>
+                </a:clrFrom>
+                <a:clrTo>
+                  <a:srgbClr val="FFFFFF">
+                    <a:alpha val="0"/>
+                  </a:srgbClr>
+                </a:clrTo>
+              </a:clrChange>
+              <a:extLst>
+                <a:ext uri="{28A0092B-C50C-407E-A947-70E740481C1C}">
+                  <a14:useLocalDpi xmlns:a14="http://schemas.microsoft.com/office/drawing/2010/main" val="0"/>
+                </a:ext>
+              </a:extLst>
+            </a:blip>
+            <a:stretch>
+              <a:fillRect/>
+            </a:stretch>
+          </p:blipFill>
+          <p:spPr>
+            <a:xfrm>
+              <a:off x="1052467" y="-15269"/>
+              <a:ext cx="7022013" cy="6873269"/>
+            </a:xfrm>
+            <a:prstGeom prst="rect">
+              <a:avLst/>
+            </a:prstGeom>
+          </p:spPr>
+        </p:pic>
+        <p:grpSp>
+          <p:nvGrpSpPr>
+            <p:cNvPr id="16" name="Group 15"/>
+            <p:cNvGrpSpPr/>
+            <p:nvPr/>
+          </p:nvGrpSpPr>
+          <p:grpSpPr>
+            <a:xfrm>
+              <a:off x="8083111" y="-120213"/>
+              <a:ext cx="798807" cy="6677799"/>
+              <a:chOff x="3265715" y="62592"/>
+              <a:chExt cx="798807" cy="6677799"/>
+            </a:xfrm>
+          </p:grpSpPr>
+          <p:pic>
+            <p:nvPicPr>
+              <p:cNvPr id="17" name="Picture 16"/>
+              <p:cNvPicPr>
+                <a:picLocks noChangeAspect="1"/>
+              </p:cNvPicPr>
+              <p:nvPr/>
+            </p:nvPicPr>
+            <p:blipFill rotWithShape="1">
+              <a:blip r:embed="rId4">
+                <a:extLst>
+                  <a:ext uri="{28A0092B-C50C-407E-A947-70E740481C1C}">
+                    <a14:useLocalDpi xmlns:a14="http://schemas.microsoft.com/office/drawing/2010/main" val="0"/>
+                  </a:ext>
+                </a:extLst>
+              </a:blip>
+              <a:srcRect l="413" r="1" b="43333"/>
+              <a:stretch/>
+            </p:blipFill>
+            <p:spPr>
+              <a:xfrm rot="16200000">
+                <a:off x="239862" y="3187168"/>
+                <a:ext cx="6468085" cy="416379"/>
+              </a:xfrm>
+              <a:prstGeom prst="rect">
+                <a:avLst/>
+              </a:prstGeom>
+            </p:spPr>
+          </p:pic>
+          <p:sp>
+            <p:nvSpPr>
+              <p:cNvPr id="18" name="TextBox 17"/>
+              <p:cNvSpPr txBox="1"/>
+              <p:nvPr/>
+            </p:nvSpPr>
+            <p:spPr>
+              <a:xfrm>
+                <a:off x="3592285" y="1330778"/>
+                <a:ext cx="415498" cy="276999"/>
+              </a:xfrm>
+              <a:prstGeom prst="rect">
+                <a:avLst/>
+              </a:prstGeom>
+              <a:noFill/>
+            </p:spPr>
+            <p:txBody>
+              <a:bodyPr wrap="none" rtlCol="0">
+                <a:spAutoFit/>
+              </a:bodyPr>
+              <a:lstStyle/>
+              <a:p>
+                <a:r>
+                  <a:rPr lang="en-US" sz="1200" b="1" dirty="0">
+                    <a:latin typeface="Arial Rounded MT Bold" pitchFamily="34" charset="0"/>
+                    <a:cs typeface="Arial" pitchFamily="34" charset="0"/>
+                  </a:rPr>
+                  <a:t>4.5</a:t>
+                </a:r>
+              </a:p>
+            </p:txBody>
+          </p:sp>
+          <p:sp>
+            <p:nvSpPr>
+              <p:cNvPr id="19" name="TextBox 18"/>
+              <p:cNvSpPr txBox="1"/>
+              <p:nvPr/>
+            </p:nvSpPr>
+            <p:spPr>
+              <a:xfrm>
+                <a:off x="3589564" y="2626178"/>
+                <a:ext cx="415498" cy="276999"/>
+              </a:xfrm>
+              <a:prstGeom prst="rect">
+                <a:avLst/>
+              </a:prstGeom>
+              <a:noFill/>
+            </p:spPr>
+            <p:txBody>
+              <a:bodyPr wrap="none" rtlCol="0">
+                <a:spAutoFit/>
+              </a:bodyPr>
+              <a:lstStyle/>
+              <a:p>
+                <a:r>
+                  <a:rPr lang="en-US" sz="1200" b="1" dirty="0">
+                    <a:latin typeface="Arial Rounded MT Bold" pitchFamily="34" charset="0"/>
+                    <a:cs typeface="Arial" pitchFamily="34" charset="0"/>
+                  </a:rPr>
+                  <a:t>2.5</a:t>
+                </a:r>
+              </a:p>
+            </p:txBody>
+          </p:sp>
+          <p:sp>
+            <p:nvSpPr>
+              <p:cNvPr id="20" name="TextBox 19"/>
+              <p:cNvSpPr txBox="1"/>
+              <p:nvPr/>
+            </p:nvSpPr>
+            <p:spPr>
+              <a:xfrm>
+                <a:off x="3589563" y="3907971"/>
+                <a:ext cx="415498" cy="276999"/>
+              </a:xfrm>
+              <a:prstGeom prst="rect">
+                <a:avLst/>
+              </a:prstGeom>
+              <a:noFill/>
+            </p:spPr>
+            <p:txBody>
+              <a:bodyPr wrap="none" rtlCol="0">
+                <a:spAutoFit/>
+              </a:bodyPr>
+              <a:lstStyle/>
+              <a:p>
+                <a:r>
+                  <a:rPr lang="en-US" sz="1200" b="1" dirty="0">
+                    <a:latin typeface="Arial Rounded MT Bold" pitchFamily="34" charset="0"/>
+                    <a:cs typeface="Arial" pitchFamily="34" charset="0"/>
+                  </a:rPr>
+                  <a:t>0.5</a:t>
+                </a:r>
+              </a:p>
+            </p:txBody>
+          </p:sp>
+          <p:sp>
+            <p:nvSpPr>
+              <p:cNvPr id="21" name="TextBox 20"/>
+              <p:cNvSpPr txBox="1"/>
+              <p:nvPr/>
+            </p:nvSpPr>
+            <p:spPr>
+              <a:xfrm>
+                <a:off x="3597728" y="5214257"/>
+                <a:ext cx="466794" cy="276999"/>
+              </a:xfrm>
+              <a:prstGeom prst="rect">
+                <a:avLst/>
+              </a:prstGeom>
+              <a:noFill/>
+            </p:spPr>
+            <p:txBody>
+              <a:bodyPr wrap="none" rtlCol="0">
+                <a:spAutoFit/>
+              </a:bodyPr>
+              <a:lstStyle/>
+              <a:p>
+                <a:r>
+                  <a:rPr lang="en-US" sz="1200" b="1" dirty="0">
+                    <a:latin typeface="Arial Rounded MT Bold" pitchFamily="34" charset="0"/>
+                    <a:cs typeface="Arial" pitchFamily="34" charset="0"/>
+                  </a:rPr>
+                  <a:t>-1.5</a:t>
+                </a:r>
+              </a:p>
+            </p:txBody>
+          </p:sp>
+          <p:sp>
+            <p:nvSpPr>
+              <p:cNvPr id="22" name="TextBox 21"/>
+              <p:cNvSpPr txBox="1"/>
+              <p:nvPr/>
+            </p:nvSpPr>
+            <p:spPr>
+              <a:xfrm>
+                <a:off x="3589564" y="6463392"/>
+                <a:ext cx="466794" cy="276999"/>
+              </a:xfrm>
+              <a:prstGeom prst="rect">
+                <a:avLst/>
+              </a:prstGeom>
+              <a:noFill/>
+            </p:spPr>
+            <p:txBody>
+              <a:bodyPr wrap="none" rtlCol="0">
+                <a:spAutoFit/>
+              </a:bodyPr>
+              <a:lstStyle/>
+              <a:p>
+                <a:r>
+                  <a:rPr lang="en-US" sz="1200" b="1" dirty="0">
+                    <a:latin typeface="Arial Rounded MT Bold" pitchFamily="34" charset="0"/>
+                    <a:cs typeface="Arial" pitchFamily="34" charset="0"/>
+                  </a:rPr>
+                  <a:t>-3.5</a:t>
+                </a:r>
+              </a:p>
+            </p:txBody>
+          </p:sp>
+          <p:sp>
+            <p:nvSpPr>
+              <p:cNvPr id="23" name="TextBox 22"/>
+              <p:cNvSpPr txBox="1"/>
+              <p:nvPr/>
+            </p:nvSpPr>
+            <p:spPr>
+              <a:xfrm>
+                <a:off x="3597729" y="62592"/>
+                <a:ext cx="415498" cy="276999"/>
+              </a:xfrm>
+              <a:prstGeom prst="rect">
+                <a:avLst/>
+              </a:prstGeom>
+              <a:noFill/>
+            </p:spPr>
+            <p:txBody>
+              <a:bodyPr wrap="none" rtlCol="0">
+                <a:spAutoFit/>
+              </a:bodyPr>
+              <a:lstStyle/>
+              <a:p>
+                <a:r>
+                  <a:rPr lang="en-US" sz="1200" b="1" dirty="0">
+                    <a:latin typeface="Arial Rounded MT Bold" pitchFamily="34" charset="0"/>
+                    <a:cs typeface="Arial" pitchFamily="34" charset="0"/>
+                  </a:rPr>
+                  <a:t>6.5</a:t>
+                </a:r>
+              </a:p>
+            </p:txBody>
+          </p:sp>
+        </p:grpSp>
+      </p:grpSp>
+    </p:spTree>
+    <p:extLst>
+      <p:ext uri="{BB962C8B-B14F-4D97-AF65-F5344CB8AC3E}">
+        <p14:creationId xmlns:p14="http://schemas.microsoft.com/office/powerpoint/2010/main" val="3732459382"/>
+      </p:ext>
+    </p:extLst>
+  </p:cSld>
+  <p:clrMapOvr>
+    <a:masterClrMapping/>
+  </p:clrMapOvr>
+  <p:timing>
+    <p:tnLst>
+      <p:par>
+        <p:cTn id="1" dur="indefinite" restart="never" nodeType="tmRoot"/>
+      </p:par>
+    </p:tnLst>
+  </p:timing>
+</p:sld>
+</file>
+
+<file path=ppt/slides/slide5.xml><?xml version="1.0" encoding="utf-8"?>
+<p:sld xmlns:a="http://schemas.openxmlformats.org/drawingml/2006/main" xmlns:r="http://schemas.openxmlformats.org/officeDocument/2006/relationships" xmlns:p="http://schemas.openxmlformats.org/presentationml/2006/main">
+  <p:cSld>
+    <p:spTree>
+      <p:nvGrpSpPr>
+        <p:cNvPr id="1" name=""/>
+        <p:cNvGrpSpPr/>
+        <p:nvPr/>
+      </p:nvGrpSpPr>
+      <p:grpSpPr>
+        <a:xfrm>
+          <a:off x="0" y="0"/>
+          <a:ext cx="0" cy="0"/>
+          <a:chOff x="0" y="0"/>
+          <a:chExt cx="0" cy="0"/>
+        </a:xfrm>
+      </p:grpSpPr>
+      <p:grpSp>
+        <p:nvGrpSpPr>
           <p:cNvPr id="7" name="Group 6"/>
           <p:cNvGrpSpPr/>
           <p:nvPr/>
@@ -3828,7 +4560,7 @@
 </p:sld>
 </file>
 
-<file path=ppt/slides/slide4.xml><?xml version="1.0" encoding="utf-8"?>
+<file path=ppt/slides/slide6.xml><?xml version="1.0" encoding="utf-8"?>
 <p:sld xmlns:a="http://schemas.openxmlformats.org/drawingml/2006/main" xmlns:r="http://schemas.openxmlformats.org/officeDocument/2006/relationships" xmlns:p="http://schemas.openxmlformats.org/presentationml/2006/main">
   <p:cSld>
     <p:spTree>
@@ -4328,7 +5060,7 @@
 </p:sld>
 </file>
 
-<file path=ppt/slides/slide5.xml><?xml version="1.0" encoding="utf-8"?>
+<file path=ppt/slides/slide7.xml><?xml version="1.0" encoding="utf-8"?>
 <p:sld xmlns:a="http://schemas.openxmlformats.org/drawingml/2006/main" xmlns:r="http://schemas.openxmlformats.org/officeDocument/2006/relationships" xmlns:p="http://schemas.openxmlformats.org/presentationml/2006/main">
   <p:cSld>
     <p:spTree>
@@ -4450,7 +5182,7 @@
 </p:sld>
 </file>
 
-<file path=ppt/slides/slide6.xml><?xml version="1.0" encoding="utf-8"?>
+<file path=ppt/slides/slide8.xml><?xml version="1.0" encoding="utf-8"?>
 <p:sld xmlns:a="http://schemas.openxmlformats.org/drawingml/2006/main" xmlns:r="http://schemas.openxmlformats.org/officeDocument/2006/relationships" xmlns:p="http://schemas.openxmlformats.org/presentationml/2006/main">
   <p:cSld>
     <p:spTree>

</xml_diff>

<commit_message>
updated the centroid offset figures, closes issues #25 #26 and #36
</commit_message>
<xml_diff>
--- a/Chapter4/AnalysisFiles/Reformatted Figures.pptx
+++ b/Chapter4/AnalysisFiles/Reformatted Figures.pptx
@@ -113,7 +113,7 @@
   </p:defaultTextStyle>
   <p:extLst>
     <p:ext uri="{EFAFB233-063F-42B5-8137-9DF3F51BA10A}">
-      <p15:sldGuideLst xmlns:p15="http://schemas.microsoft.com/office/powerpoint/2012/main">
+      <p15:sldGuideLst xmlns:p15="http://schemas.microsoft.com/office/powerpoint/2012/main" xmlns="">
         <p15:guide id="1" orient="horz" pos="2160">
           <p15:clr>
             <a:srgbClr val="A4A3A4"/>
@@ -311,7 +311,7 @@
           <a:p>
             <a:fld id="{6BED7B28-07E3-435C-93B6-8F423A08B503}" type="datetimeFigureOut">
               <a:rPr lang="en-US" smtClean="0"/>
-              <a:t>8/16/2013</a:t>
+              <a:t>8/27/2013</a:t>
             </a:fld>
             <a:endParaRPr lang="en-US"/>
           </a:p>
@@ -481,7 +481,7 @@
           <a:p>
             <a:fld id="{6BED7B28-07E3-435C-93B6-8F423A08B503}" type="datetimeFigureOut">
               <a:rPr lang="en-US" smtClean="0"/>
-              <a:t>8/16/2013</a:t>
+              <a:t>8/27/2013</a:t>
             </a:fld>
             <a:endParaRPr lang="en-US"/>
           </a:p>
@@ -661,7 +661,7 @@
           <a:p>
             <a:fld id="{6BED7B28-07E3-435C-93B6-8F423A08B503}" type="datetimeFigureOut">
               <a:rPr lang="en-US" smtClean="0"/>
-              <a:t>8/16/2013</a:t>
+              <a:t>8/27/2013</a:t>
             </a:fld>
             <a:endParaRPr lang="en-US"/>
           </a:p>
@@ -831,7 +831,7 @@
           <a:p>
             <a:fld id="{6BED7B28-07E3-435C-93B6-8F423A08B503}" type="datetimeFigureOut">
               <a:rPr lang="en-US" smtClean="0"/>
-              <a:t>8/16/2013</a:t>
+              <a:t>8/27/2013</a:t>
             </a:fld>
             <a:endParaRPr lang="en-US"/>
           </a:p>
@@ -1077,7 +1077,7 @@
           <a:p>
             <a:fld id="{6BED7B28-07E3-435C-93B6-8F423A08B503}" type="datetimeFigureOut">
               <a:rPr lang="en-US" smtClean="0"/>
-              <a:t>8/16/2013</a:t>
+              <a:t>8/27/2013</a:t>
             </a:fld>
             <a:endParaRPr lang="en-US"/>
           </a:p>
@@ -1365,7 +1365,7 @@
           <a:p>
             <a:fld id="{6BED7B28-07E3-435C-93B6-8F423A08B503}" type="datetimeFigureOut">
               <a:rPr lang="en-US" smtClean="0"/>
-              <a:t>8/16/2013</a:t>
+              <a:t>8/27/2013</a:t>
             </a:fld>
             <a:endParaRPr lang="en-US"/>
           </a:p>
@@ -1787,7 +1787,7 @@
           <a:p>
             <a:fld id="{6BED7B28-07E3-435C-93B6-8F423A08B503}" type="datetimeFigureOut">
               <a:rPr lang="en-US" smtClean="0"/>
-              <a:t>8/16/2013</a:t>
+              <a:t>8/27/2013</a:t>
             </a:fld>
             <a:endParaRPr lang="en-US"/>
           </a:p>
@@ -1905,7 +1905,7 @@
           <a:p>
             <a:fld id="{6BED7B28-07E3-435C-93B6-8F423A08B503}" type="datetimeFigureOut">
               <a:rPr lang="en-US" smtClean="0"/>
-              <a:t>8/16/2013</a:t>
+              <a:t>8/27/2013</a:t>
             </a:fld>
             <a:endParaRPr lang="en-US"/>
           </a:p>
@@ -2000,7 +2000,7 @@
           <a:p>
             <a:fld id="{6BED7B28-07E3-435C-93B6-8F423A08B503}" type="datetimeFigureOut">
               <a:rPr lang="en-US" smtClean="0"/>
-              <a:t>8/16/2013</a:t>
+              <a:t>8/27/2013</a:t>
             </a:fld>
             <a:endParaRPr lang="en-US"/>
           </a:p>
@@ -2277,7 +2277,7 @@
           <a:p>
             <a:fld id="{6BED7B28-07E3-435C-93B6-8F423A08B503}" type="datetimeFigureOut">
               <a:rPr lang="en-US" smtClean="0"/>
-              <a:t>8/16/2013</a:t>
+              <a:t>8/27/2013</a:t>
             </a:fld>
             <a:endParaRPr lang="en-US"/>
           </a:p>
@@ -2530,7 +2530,7 @@
           <a:p>
             <a:fld id="{6BED7B28-07E3-435C-93B6-8F423A08B503}" type="datetimeFigureOut">
               <a:rPr lang="en-US" smtClean="0"/>
-              <a:t>8/16/2013</a:t>
+              <a:t>8/27/2013</a:t>
             </a:fld>
             <a:endParaRPr lang="en-US"/>
           </a:p>
@@ -2743,7 +2743,7 @@
           <a:p>
             <a:fld id="{6BED7B28-07E3-435C-93B6-8F423A08B503}" type="datetimeFigureOut">
               <a:rPr lang="en-US" smtClean="0"/>
-              <a:t>8/16/2013</a:t>
+              <a:t>8/27/2013</a:t>
             </a:fld>
             <a:endParaRPr lang="en-US"/>
           </a:p>
@@ -4194,7 +4194,7 @@
       </p:grpSpPr>
       <p:grpSp>
         <p:nvGrpSpPr>
-          <p:cNvPr id="7" name="Group 6"/>
+          <p:cNvPr id="13" name="Group 12"/>
           <p:cNvGrpSpPr/>
           <p:nvPr/>
         </p:nvGrpSpPr>
@@ -4208,7 +4208,7 @@
         </p:grpSpPr>
         <p:grpSp>
           <p:nvGrpSpPr>
-            <p:cNvPr id="2" name="Group 1"/>
+            <p:cNvPr id="7" name="Group 6"/>
             <p:cNvGrpSpPr/>
             <p:nvPr/>
           </p:nvGrpSpPr>
@@ -4220,103 +4220,308 @@
               <a:chExt cx="5486400" cy="4167635"/>
             </a:xfrm>
           </p:grpSpPr>
-          <p:pic>
-            <p:nvPicPr>
-              <p:cNvPr id="2050" name="Picture 2" descr="C:\Users\WILLDA~1\AppData\Local\Temp\VMwareDnD\9110b323\northcentroids_histplot2d.png"/>
-              <p:cNvPicPr>
-                <a:picLocks noChangeAspect="1" noChangeArrowheads="1"/>
-              </p:cNvPicPr>
+          <p:grpSp>
+            <p:nvGrpSpPr>
+              <p:cNvPr id="2" name="Group 1"/>
+              <p:cNvGrpSpPr/>
               <p:nvPr/>
-            </p:nvPicPr>
-            <p:blipFill>
-              <a:blip r:embed="rId2">
-                <a:extLst>
-                  <a:ext uri="{28A0092B-C50C-407E-A947-70E740481C1C}">
-                    <a14:useLocalDpi xmlns:a14="http://schemas.microsoft.com/office/drawing/2010/main" val="0"/>
-                  </a:ext>
-                </a:extLst>
-              </a:blip>
-              <a:srcRect/>
-              <a:stretch>
-                <a:fillRect/>
-              </a:stretch>
-            </p:blipFill>
-            <p:spPr bwMode="auto">
+            </p:nvGrpSpPr>
+            <p:grpSpPr>
               <a:xfrm>
                 <a:off x="1752031" y="1194323"/>
                 <a:ext cx="5486400" cy="4167635"/>
+                <a:chOff x="1752031" y="1194323"/>
+                <a:chExt cx="5486400" cy="4167635"/>
               </a:xfrm>
-              <a:prstGeom prst="rect">
+            </p:grpSpPr>
+            <p:pic>
+              <p:nvPicPr>
+                <p:cNvPr id="2050" name="Picture 2" descr="C:\Users\WILLDA~1\AppData\Local\Temp\VMwareDnD\9110b323\northcentroids_histplot2d.png"/>
+                <p:cNvPicPr>
+                  <a:picLocks noChangeAspect="1" noChangeArrowheads="1"/>
+                </p:cNvPicPr>
+                <p:nvPr/>
+              </p:nvPicPr>
+              <p:blipFill>
+                <a:blip r:embed="rId2">
+                  <a:extLst>
+                    <a:ext uri="{28A0092B-C50C-407E-A947-70E740481C1C}">
+                      <a14:useLocalDpi xmlns:a14="http://schemas.microsoft.com/office/drawing/2010/main" val="0"/>
+                    </a:ext>
+                  </a:extLst>
+                </a:blip>
+                <a:srcRect/>
+                <a:stretch>
+                  <a:fillRect/>
+                </a:stretch>
+              </p:blipFill>
+              <p:spPr bwMode="auto">
+                <a:xfrm>
+                  <a:off x="1752031" y="1194323"/>
+                  <a:ext cx="5486400" cy="4167635"/>
+                </a:xfrm>
+                <a:prstGeom prst="rect">
+                  <a:avLst/>
+                </a:prstGeom>
+                <a:noFill/>
+                <a:extLst>
+                  <a:ext uri="{909E8E84-426E-40DD-AFC4-6F175D3DCCD1}">
+                    <a14:hiddenFill xmlns:a14="http://schemas.microsoft.com/office/drawing/2010/main">
+                      <a:solidFill>
+                        <a:srgbClr val="FFFFFF"/>
+                      </a:solidFill>
+                    </a14:hiddenFill>
+                  </a:ext>
+                </a:extLst>
+              </p:spPr>
+            </p:pic>
+            <p:sp>
+              <p:nvSpPr>
+                <p:cNvPr id="3" name="TextBox 2"/>
+                <p:cNvSpPr txBox="1"/>
+                <p:nvPr/>
+              </p:nvSpPr>
+              <p:spPr>
+                <a:xfrm>
+                  <a:off x="5165766" y="4744193"/>
+                  <a:ext cx="1872949" cy="338554"/>
+                </a:xfrm>
+                <a:prstGeom prst="rect">
+                  <a:avLst/>
+                </a:prstGeom>
+                <a:noFill/>
+              </p:spPr>
+              <p:txBody>
+                <a:bodyPr wrap="none" rtlCol="0">
+                  <a:spAutoFit/>
+                </a:bodyPr>
+                <a:lstStyle/>
+                <a:p>
+                  <a:r>
+                    <a:rPr lang="en-US" sz="1600" dirty="0" smtClean="0"/>
+                    <a:t>Northern Subcluster</a:t>
+                  </a:r>
+                  <a:endParaRPr lang="en-US" sz="1600" dirty="0"/>
+                </a:p>
+              </p:txBody>
+            </p:sp>
+            <p:sp>
+              <p:nvSpPr>
+                <p:cNvPr id="5" name="Line Callout 2 (Accent Bar) 4"/>
+                <p:cNvSpPr/>
+                <p:nvPr/>
+              </p:nvSpPr>
+              <p:spPr>
+                <a:xfrm>
+                  <a:off x="2489712" y="4077725"/>
+                  <a:ext cx="914400" cy="457200"/>
+                </a:xfrm>
+                <a:prstGeom prst="accentCallout2">
+                  <a:avLst>
+                    <a:gd name="adj1" fmla="val 18750"/>
+                    <a:gd name="adj2" fmla="val 105100"/>
+                    <a:gd name="adj3" fmla="val 18846"/>
+                    <a:gd name="adj4" fmla="val 113499"/>
+                    <a:gd name="adj5" fmla="val -102398"/>
+                    <a:gd name="adj6" fmla="val 148875"/>
+                  </a:avLst>
+                </a:prstGeom>
+                <a:noFill/>
+                <a:ln>
+                  <a:solidFill>
+                    <a:schemeClr val="accent2"/>
+                  </a:solidFill>
+                </a:ln>
+              </p:spPr>
+              <p:style>
+                <a:lnRef idx="2">
+                  <a:schemeClr val="accent1">
+                    <a:shade val="50000"/>
+                  </a:schemeClr>
+                </a:lnRef>
+                <a:fillRef idx="1">
+                  <a:schemeClr val="accent1"/>
+                </a:fillRef>
+                <a:effectRef idx="0">
+                  <a:schemeClr val="accent1"/>
+                </a:effectRef>
+                <a:fontRef idx="minor">
+                  <a:schemeClr val="lt1"/>
+                </a:fontRef>
+              </p:style>
+              <p:txBody>
+                <a:bodyPr rtlCol="0" anchor="ctr"/>
+                <a:lstStyle/>
+                <a:p>
+                  <a:pPr algn="r"/>
+                  <a:r>
+                    <a:rPr lang="en-US" sz="1600" dirty="0" smtClean="0">
+                      <a:solidFill>
+                        <a:schemeClr val="accent2"/>
+                      </a:solidFill>
+                    </a:rPr>
+                    <a:t>Galaxy</a:t>
+                  </a:r>
+                </a:p>
+                <a:p>
+                  <a:pPr algn="r"/>
+                  <a:r>
+                    <a:rPr lang="en-US" sz="1600" dirty="0" smtClean="0">
+                      <a:solidFill>
+                        <a:schemeClr val="accent2"/>
+                      </a:solidFill>
+                    </a:rPr>
+                    <a:t>Centroid</a:t>
+                  </a:r>
+                  <a:endParaRPr lang="en-US" sz="1600" dirty="0">
+                    <a:solidFill>
+                      <a:schemeClr val="accent2"/>
+                    </a:solidFill>
+                  </a:endParaRPr>
+                </a:p>
+              </p:txBody>
+            </p:sp>
+            <p:sp>
+              <p:nvSpPr>
+                <p:cNvPr id="6" name="Line Callout 2 (Accent Bar) 5"/>
+                <p:cNvSpPr/>
+                <p:nvPr/>
+              </p:nvSpPr>
+              <p:spPr>
+                <a:xfrm>
+                  <a:off x="2553046" y="1742243"/>
+                  <a:ext cx="914400" cy="457200"/>
+                </a:xfrm>
+                <a:prstGeom prst="accentCallout2">
+                  <a:avLst>
+                    <a:gd name="adj1" fmla="val 18750"/>
+                    <a:gd name="adj2" fmla="val 105100"/>
+                    <a:gd name="adj3" fmla="val 18846"/>
+                    <a:gd name="adj4" fmla="val 113499"/>
+                    <a:gd name="adj5" fmla="val 178445"/>
+                    <a:gd name="adj6" fmla="val 174199"/>
+                  </a:avLst>
+                </a:prstGeom>
+                <a:noFill/>
+                <a:ln>
+                  <a:solidFill>
+                    <a:schemeClr val="accent1"/>
+                  </a:solidFill>
+                </a:ln>
+              </p:spPr>
+              <p:style>
+                <a:lnRef idx="2">
+                  <a:schemeClr val="accent1">
+                    <a:shade val="50000"/>
+                  </a:schemeClr>
+                </a:lnRef>
+                <a:fillRef idx="1">
+                  <a:schemeClr val="accent1"/>
+                </a:fillRef>
+                <a:effectRef idx="0">
+                  <a:schemeClr val="accent1"/>
+                </a:effectRef>
+                <a:fontRef idx="minor">
+                  <a:schemeClr val="lt1"/>
+                </a:fontRef>
+              </p:style>
+              <p:txBody>
+                <a:bodyPr rtlCol="0" anchor="ctr"/>
+                <a:lstStyle/>
+                <a:p>
+                  <a:pPr algn="r"/>
+                  <a:r>
+                    <a:rPr lang="en-US" sz="1600" dirty="0" smtClean="0">
+                      <a:solidFill>
+                        <a:schemeClr val="accent1"/>
+                      </a:solidFill>
+                    </a:rPr>
+                    <a:t>Lensing</a:t>
+                  </a:r>
+                </a:p>
+                <a:p>
+                  <a:pPr algn="r"/>
+                  <a:r>
+                    <a:rPr lang="en-US" sz="1600" dirty="0" smtClean="0">
+                      <a:solidFill>
+                        <a:schemeClr val="accent1"/>
+                      </a:solidFill>
+                    </a:rPr>
+                    <a:t>Centroid</a:t>
+                  </a:r>
+                  <a:endParaRPr lang="en-US" sz="1600" dirty="0">
+                    <a:solidFill>
+                      <a:schemeClr val="accent1"/>
+                    </a:solidFill>
+                  </a:endParaRPr>
+                </a:p>
+              </p:txBody>
+            </p:sp>
+          </p:grpSp>
+          <p:cxnSp>
+            <p:nvCxnSpPr>
+              <p:cNvPr id="8" name="Straight Connector 7"/>
+              <p:cNvCxnSpPr/>
+              <p:nvPr/>
+            </p:nvCxnSpPr>
+            <p:spPr>
+              <a:xfrm flipV="1">
+                <a:off x="3734790" y="1318160"/>
+                <a:ext cx="1453896" cy="3758184"/>
+              </a:xfrm>
+              <a:prstGeom prst="line">
                 <a:avLst/>
               </a:prstGeom>
-              <a:noFill/>
-              <a:extLst>
-                <a:ext uri="{909E8E84-426E-40DD-AFC4-6F175D3DCCD1}">
-                  <a14:hiddenFill xmlns:a14="http://schemas.microsoft.com/office/drawing/2010/main">
-                    <a:solidFill>
-                      <a:srgbClr val="FFFFFF"/>
-                    </a:solidFill>
-                  </a14:hiddenFill>
-                </a:ext>
-              </a:extLst>
+              <a:ln w="19050">
+                <a:solidFill>
+                  <a:schemeClr val="accent4"/>
+                </a:solidFill>
+                <a:prstDash val="dash"/>
+                <a:tailEnd type="stealth" w="lg" len="lg"/>
+              </a:ln>
             </p:spPr>
-          </p:pic>
+            <p:style>
+              <a:lnRef idx="1">
+                <a:schemeClr val="accent1"/>
+              </a:lnRef>
+              <a:fillRef idx="0">
+                <a:schemeClr val="accent1"/>
+              </a:fillRef>
+              <a:effectRef idx="0">
+                <a:schemeClr val="accent1"/>
+              </a:effectRef>
+              <a:fontRef idx="minor">
+                <a:schemeClr val="tx1"/>
+              </a:fontRef>
+            </p:style>
+          </p:cxnSp>
           <p:sp>
             <p:nvSpPr>
-              <p:cNvPr id="3" name="TextBox 2"/>
-              <p:cNvSpPr txBox="1"/>
-              <p:nvPr/>
-            </p:nvSpPr>
-            <p:spPr>
-              <a:xfrm>
-                <a:off x="5165766" y="4744193"/>
-                <a:ext cx="1872949" cy="338554"/>
-              </a:xfrm>
-              <a:prstGeom prst="rect">
-                <a:avLst/>
-              </a:prstGeom>
-              <a:noFill/>
-            </p:spPr>
-            <p:txBody>
-              <a:bodyPr wrap="none" rtlCol="0">
-                <a:spAutoFit/>
-              </a:bodyPr>
-              <a:lstStyle/>
-              <a:p>
-                <a:r>
-                  <a:rPr lang="en-US" sz="1600" dirty="0" smtClean="0"/>
-                  <a:t>Northern Subcluster</a:t>
-                </a:r>
-                <a:endParaRPr lang="en-US" sz="1600" dirty="0"/>
-              </a:p>
-            </p:txBody>
-          </p:sp>
-          <p:sp>
-            <p:nvSpPr>
-              <p:cNvPr id="5" name="Line Callout 2 (Accent Bar) 4"/>
+              <p:cNvPr id="9" name="Line Callout 2 (Accent Bar) 8"/>
               <p:cNvSpPr/>
               <p:nvPr/>
             </p:nvSpPr>
             <p:spPr>
               <a:xfrm>
-                <a:off x="2489712" y="4077725"/>
-                <a:ext cx="914400" cy="457200"/>
+                <a:off x="3420093" y="1385985"/>
+                <a:ext cx="1288326" cy="245660"/>
               </a:xfrm>
               <a:prstGeom prst="accentCallout2">
                 <a:avLst>
                   <a:gd name="adj1" fmla="val 18750"/>
-                  <a:gd name="adj2" fmla="val 105100"/>
+                  <a:gd name="adj2" fmla="val 100491"/>
                   <a:gd name="adj3" fmla="val 18846"/>
-                  <a:gd name="adj4" fmla="val 113499"/>
-                  <a:gd name="adj5" fmla="val -102398"/>
-                  <a:gd name="adj6" fmla="val 148875"/>
+                  <a:gd name="adj4" fmla="val 108429"/>
+                  <a:gd name="adj5" fmla="val 67659"/>
+                  <a:gd name="adj6" fmla="val 129369"/>
                 </a:avLst>
               </a:prstGeom>
               <a:noFill/>
-              <a:ln>
+              <a:ln w="12700">
                 <a:solidFill>
-                  <a:schemeClr val="accent2"/>
+                  <a:schemeClr val="accent4"/>
                 </a:solidFill>
+                <a:prstDash val="dash"/>
               </a:ln>
             </p:spPr>
             <p:style>
@@ -4341,103 +4546,16 @@
               <a:p>
                 <a:pPr algn="r"/>
                 <a:r>
-                  <a:rPr lang="en-US" sz="1600" dirty="0" smtClean="0">
+                  <a:rPr lang="en-US" sz="1400" dirty="0" smtClean="0">
                     <a:solidFill>
-                      <a:schemeClr val="accent2"/>
+                      <a:schemeClr val="accent4"/>
                     </a:solidFill>
                   </a:rPr>
-                  <a:t>Galaxy</a:t>
+                  <a:t>Merger Axis</a:t>
                 </a:r>
-              </a:p>
-              <a:p>
-                <a:pPr algn="r"/>
-                <a:r>
-                  <a:rPr lang="en-US" sz="1600" dirty="0" smtClean="0">
-                    <a:solidFill>
-                      <a:schemeClr val="accent2"/>
-                    </a:solidFill>
-                  </a:rPr>
-                  <a:t>Centroid</a:t>
-                </a:r>
-                <a:endParaRPr lang="en-US" sz="1600" dirty="0">
+                <a:endParaRPr lang="en-US" sz="1400" dirty="0">
                   <a:solidFill>
-                    <a:schemeClr val="accent2"/>
-                  </a:solidFill>
-                </a:endParaRPr>
-              </a:p>
-            </p:txBody>
-          </p:sp>
-          <p:sp>
-            <p:nvSpPr>
-              <p:cNvPr id="6" name="Line Callout 2 (Accent Bar) 5"/>
-              <p:cNvSpPr/>
-              <p:nvPr/>
-            </p:nvSpPr>
-            <p:spPr>
-              <a:xfrm>
-                <a:off x="2553046" y="1742243"/>
-                <a:ext cx="914400" cy="457200"/>
-              </a:xfrm>
-              <a:prstGeom prst="accentCallout2">
-                <a:avLst>
-                  <a:gd name="adj1" fmla="val 18750"/>
-                  <a:gd name="adj2" fmla="val 105100"/>
-                  <a:gd name="adj3" fmla="val 18846"/>
-                  <a:gd name="adj4" fmla="val 113499"/>
-                  <a:gd name="adj5" fmla="val 178445"/>
-                  <a:gd name="adj6" fmla="val 174199"/>
-                </a:avLst>
-              </a:prstGeom>
-              <a:noFill/>
-              <a:ln>
-                <a:solidFill>
-                  <a:schemeClr val="accent1"/>
-                </a:solidFill>
-              </a:ln>
-            </p:spPr>
-            <p:style>
-              <a:lnRef idx="2">
-                <a:schemeClr val="accent1">
-                  <a:shade val="50000"/>
-                </a:schemeClr>
-              </a:lnRef>
-              <a:fillRef idx="1">
-                <a:schemeClr val="accent1"/>
-              </a:fillRef>
-              <a:effectRef idx="0">
-                <a:schemeClr val="accent1"/>
-              </a:effectRef>
-              <a:fontRef idx="minor">
-                <a:schemeClr val="lt1"/>
-              </a:fontRef>
-            </p:style>
-            <p:txBody>
-              <a:bodyPr rtlCol="0" anchor="ctr"/>
-              <a:lstStyle/>
-              <a:p>
-                <a:pPr algn="r"/>
-                <a:r>
-                  <a:rPr lang="en-US" sz="1600" dirty="0" smtClean="0">
-                    <a:solidFill>
-                      <a:schemeClr val="accent1"/>
-                    </a:solidFill>
-                  </a:rPr>
-                  <a:t>Lensing</a:t>
-                </a:r>
-              </a:p>
-              <a:p>
-                <a:pPr algn="r"/>
-                <a:r>
-                  <a:rPr lang="en-US" sz="1600" dirty="0" smtClean="0">
-                    <a:solidFill>
-                      <a:schemeClr val="accent1"/>
-                    </a:solidFill>
-                  </a:rPr>
-                  <a:t>Centroid</a:t>
-                </a:r>
-                <a:endParaRPr lang="en-US" sz="1600" dirty="0">
-                  <a:solidFill>
-                    <a:schemeClr val="accent1"/>
+                    <a:schemeClr val="accent4"/>
                   </a:solidFill>
                 </a:endParaRPr>
               </a:p>
@@ -4446,23 +4564,23 @@
         </p:grpSp>
         <p:cxnSp>
           <p:nvCxnSpPr>
-            <p:cNvPr id="8" name="Straight Connector 7"/>
+            <p:cNvPr id="10" name="Straight Connector 9"/>
             <p:cNvCxnSpPr/>
             <p:nvPr/>
           </p:nvCxnSpPr>
           <p:spPr>
             <a:xfrm flipV="1">
-              <a:off x="3734790" y="1318160"/>
-              <a:ext cx="1453896" cy="3758184"/>
+              <a:off x="2343150" y="1910443"/>
+              <a:ext cx="4686300" cy="2286000"/>
             </a:xfrm>
             <a:prstGeom prst="line">
               <a:avLst/>
             </a:prstGeom>
             <a:ln w="19050">
               <a:solidFill>
-                <a:schemeClr val="accent4"/>
+                <a:schemeClr val="accent3"/>
               </a:solidFill>
-              <a:prstDash val="dash"/>
+              <a:prstDash val="dashDot"/>
             </a:ln>
           </p:spPr>
           <p:style>
@@ -4482,31 +4600,31 @@
         </p:cxnSp>
         <p:sp>
           <p:nvSpPr>
-            <p:cNvPr id="9" name="Line Callout 2 (Accent Bar) 8"/>
+            <p:cNvPr id="14" name="Line Callout 2 (Accent Bar) 13"/>
             <p:cNvSpPr/>
             <p:nvPr/>
           </p:nvSpPr>
           <p:spPr>
             <a:xfrm>
-              <a:off x="3420093" y="1385985"/>
-              <a:ext cx="1288326" cy="245660"/>
+              <a:off x="6001026" y="1376052"/>
+              <a:ext cx="1049205" cy="605642"/>
             </a:xfrm>
             <a:prstGeom prst="accentCallout2">
               <a:avLst>
                 <a:gd name="adj1" fmla="val 18750"/>
-                <a:gd name="adj2" fmla="val 100491"/>
-                <a:gd name="adj3" fmla="val 18846"/>
-                <a:gd name="adj4" fmla="val 108429"/>
-                <a:gd name="adj5" fmla="val 67659"/>
-                <a:gd name="adj6" fmla="val 129369"/>
+                <a:gd name="adj2" fmla="val -8333"/>
+                <a:gd name="adj3" fmla="val 18750"/>
+                <a:gd name="adj4" fmla="val -16667"/>
+                <a:gd name="adj5" fmla="val 202028"/>
+                <a:gd name="adj6" fmla="val -42568"/>
               </a:avLst>
             </a:prstGeom>
             <a:noFill/>
             <a:ln w="12700">
               <a:solidFill>
-                <a:schemeClr val="accent4"/>
+                <a:schemeClr val="accent3"/>
               </a:solidFill>
-              <a:prstDash val="dash"/>
+              <a:prstDash val="dashDot"/>
             </a:ln>
           </p:spPr>
           <p:style>
@@ -4529,18 +4647,49 @@
             <a:bodyPr rtlCol="0" anchor="ctr"/>
             <a:lstStyle/>
             <a:p>
-              <a:pPr algn="r"/>
               <a:r>
                 <a:rPr lang="en-US" sz="1400" dirty="0" smtClean="0">
                   <a:solidFill>
-                    <a:schemeClr val="accent4"/>
+                    <a:schemeClr val="accent3"/>
                   </a:solidFill>
                 </a:rPr>
-                <a:t>Merger Axis</a:t>
+                <a:t>1</a:t>
+              </a:r>
+              <a:r>
+                <a:rPr lang="en-US" sz="1400" baseline="30000" dirty="0" smtClean="0">
+                  <a:solidFill>
+                    <a:schemeClr val="accent3"/>
+                  </a:solidFill>
+                </a:rPr>
+                <a:t>st</a:t>
+              </a:r>
+              <a:r>
+                <a:rPr lang="en-US" sz="1400" dirty="0" smtClean="0">
+                  <a:solidFill>
+                    <a:schemeClr val="accent3"/>
+                  </a:solidFill>
+                </a:rPr>
+                <a:t> </a:t>
+              </a:r>
+              <a:r>
+                <a:rPr lang="en-US" sz="1400" dirty="0" smtClean="0">
+                  <a:solidFill>
+                    <a:schemeClr val="accent3"/>
+                  </a:solidFill>
+                </a:rPr>
+                <a:t>Principal </a:t>
+              </a:r>
+              <a:r>
+                <a:rPr lang="en-US" sz="1400" dirty="0" smtClean="0">
+                  <a:solidFill>
+                    <a:schemeClr val="accent3"/>
+                  </a:solidFill>
+                </a:rPr>
+                <a:t>Component Axis</a:t>
               </a:r>
               <a:endParaRPr lang="en-US" sz="1400" dirty="0">
                 <a:solidFill>
-                  <a:schemeClr val="accent4"/>
+                  <a:schemeClr val="accent3"/>
                 </a:solidFill>
               </a:endParaRPr>
             </a:p>
@@ -4882,6 +5031,7 @@
                 <a:schemeClr val="accent4"/>
               </a:solidFill>
               <a:prstDash val="dash"/>
+              <a:headEnd type="stealth" w="lg" len="lg"/>
             </a:ln>
           </p:spPr>
           <p:style>
@@ -5036,7 +5186,23 @@
                     <a:schemeClr val="accent3"/>
                   </a:solidFill>
                 </a:rPr>
-                <a:t> Principle Component Axis</a:t>
+                <a:t> </a:t>
+              </a:r>
+              <a:r>
+                <a:rPr lang="en-US" sz="1400" dirty="0" smtClean="0">
+                  <a:solidFill>
+                    <a:schemeClr val="accent3"/>
+                  </a:solidFill>
+                </a:rPr>
+                <a:t>Principal </a:t>
+              </a:r>
+              <a:r>
+                <a:rPr lang="en-US" sz="1400" dirty="0" smtClean="0">
+                  <a:solidFill>
+                    <a:schemeClr val="accent3"/>
+                  </a:solidFill>
+                </a:rPr>
+                <a:t>Component Axis</a:t>
               </a:r>
               <a:endParaRPr lang="en-US" sz="1400" dirty="0">
                 <a:solidFill>

</xml_diff>